<commit_message>
Slides for FitNesse Setup
</commit_message>
<xml_diff>
--- a/Slides/20090604_Ihc_AgileAcceptanceTesting.pptx
+++ b/Slides/20090604_Ihc_AgileAcceptanceTesting.pptx
@@ -5,7 +5,7 @@
     <p:sldMasterId id="2147483732" r:id="rId1"/>
   </p:sldMasterIdLst>
   <p:notesMasterIdLst>
-    <p:notesMasterId r:id="rId29"/>
+    <p:notesMasterId r:id="rId32"/>
   </p:notesMasterIdLst>
   <p:sldIdLst>
     <p:sldId id="256" r:id="rId2"/>
@@ -22,19 +22,22 @@
     <p:sldId id="265" r:id="rId13"/>
     <p:sldId id="257" r:id="rId14"/>
     <p:sldId id="275" r:id="rId15"/>
-    <p:sldId id="279" r:id="rId16"/>
-    <p:sldId id="280" r:id="rId17"/>
-    <p:sldId id="287" r:id="rId18"/>
-    <p:sldId id="278" r:id="rId19"/>
-    <p:sldId id="286" r:id="rId20"/>
-    <p:sldId id="268" r:id="rId21"/>
-    <p:sldId id="288" r:id="rId22"/>
-    <p:sldId id="269" r:id="rId23"/>
-    <p:sldId id="270" r:id="rId24"/>
-    <p:sldId id="271" r:id="rId25"/>
-    <p:sldId id="289" r:id="rId26"/>
-    <p:sldId id="264" r:id="rId27"/>
-    <p:sldId id="285" r:id="rId28"/>
+    <p:sldId id="291" r:id="rId16"/>
+    <p:sldId id="292" r:id="rId17"/>
+    <p:sldId id="293" r:id="rId18"/>
+    <p:sldId id="279" r:id="rId19"/>
+    <p:sldId id="280" r:id="rId20"/>
+    <p:sldId id="287" r:id="rId21"/>
+    <p:sldId id="278" r:id="rId22"/>
+    <p:sldId id="286" r:id="rId23"/>
+    <p:sldId id="268" r:id="rId24"/>
+    <p:sldId id="288" r:id="rId25"/>
+    <p:sldId id="269" r:id="rId26"/>
+    <p:sldId id="270" r:id="rId27"/>
+    <p:sldId id="271" r:id="rId28"/>
+    <p:sldId id="289" r:id="rId29"/>
+    <p:sldId id="264" r:id="rId30"/>
+    <p:sldId id="285" r:id="rId31"/>
   </p:sldIdLst>
   <p:sldSz cx="9144000" cy="6858000" type="screen4x3"/>
   <p:notesSz cx="6858000" cy="9144000"/>
@@ -617,25 +620,17 @@
           </a:bodyPr>
           <a:lstStyle/>
           <a:p>
-            <a:pPr lvl="1">
-              <a:buFontTx/>
-              <a:buChar char="-"/>
-            </a:pPr>
+            <a:r>
+              <a:rPr lang="nl-BE" dirty="0" smtClean="0">
+                <a:hlinkClick r:id="rId3"/>
+              </a:rPr>
+              <a:t>http://stackoverflow.com/questions/249580/how-do-i-add-fitnesse-pages-to-version-control</a:t>
+            </a:r>
+            <a:r>
+              <a:rPr lang="nl-BE" dirty="0" smtClean="0"/>
+              <a:t> </a:t>
+            </a:r>
             <a:endParaRPr lang="nl-BE" baseline="0" dirty="0" smtClean="0"/>
-          </a:p>
-          <a:p>
-            <a:pPr>
-              <a:buFontTx/>
-              <a:buChar char="-"/>
-            </a:pPr>
-            <a:endParaRPr lang="nl-BE" baseline="0" dirty="0" smtClean="0"/>
-          </a:p>
-          <a:p>
-            <a:pPr>
-              <a:buFontTx/>
-              <a:buChar char="-"/>
-            </a:pPr>
-            <a:endParaRPr lang="nl-BE" dirty="0" smtClean="0"/>
           </a:p>
         </p:txBody>
       </p:sp>
@@ -717,25 +712,7 @@
           </a:bodyPr>
           <a:lstStyle/>
           <a:p>
-            <a:pPr lvl="1">
-              <a:buFontTx/>
-              <a:buChar char="-"/>
-            </a:pPr>
             <a:endParaRPr lang="nl-BE" baseline="0" dirty="0" smtClean="0"/>
-          </a:p>
-          <a:p>
-            <a:pPr>
-              <a:buFontTx/>
-              <a:buChar char="-"/>
-            </a:pPr>
-            <a:endParaRPr lang="nl-BE" baseline="0" dirty="0" smtClean="0"/>
-          </a:p>
-          <a:p>
-            <a:pPr>
-              <a:buFontTx/>
-              <a:buChar char="-"/>
-            </a:pPr>
-            <a:endParaRPr lang="nl-BE" dirty="0" smtClean="0"/>
           </a:p>
         </p:txBody>
       </p:sp>
@@ -819,17 +796,116 @@
           <a:p>
             <a:r>
               <a:rPr lang="nl-BE" dirty="0" smtClean="0"/>
-              <a:t>Automated</a:t>
+              <a:t>1</a:t>
+            </a:r>
+            <a:r>
+              <a:rPr lang="nl-BE" baseline="30000" dirty="0" smtClean="0"/>
+              <a:t>e</a:t>
+            </a:r>
+            <a:r>
+              <a:rPr lang="nl-BE" dirty="0" smtClean="0"/>
+              <a:t> test: Snack order</a:t>
             </a:r>
             <a:r>
               <a:rPr lang="nl-BE" baseline="0" dirty="0" smtClean="0"/>
-              <a:t> Build (vroeger-&gt; op einde iteratie)</a:t>
+              <a:t> zonder credit, credit toevoegen, snack orderen (columnFixture)</a:t>
             </a:r>
           </a:p>
           <a:p>
             <a:r>
               <a:rPr lang="nl-BE" baseline="0" dirty="0" smtClean="0"/>
-              <a:t>CI Environment (evt te schrappen)</a:t>
+              <a:t>2</a:t>
+            </a:r>
+            <a:r>
+              <a:rPr lang="nl-BE" baseline="30000" dirty="0" smtClean="0"/>
+              <a:t>e</a:t>
+            </a:r>
+            <a:r>
+              <a:rPr lang="nl-BE" baseline="0" dirty="0" smtClean="0"/>
+              <a:t> test: current orders opvragen (blanco) – order plaatsen (hergebruik bovenste fixture) – orders opvragen (rowfixture &amp; setup: orders leegmaken+credits op 0)</a:t>
+            </a:r>
+          </a:p>
+          <a:p>
+            <a:r>
+              <a:rPr lang="nl-BE" baseline="0" dirty="0" smtClean="0"/>
+              <a:t>Acceptatie door PO (iteratie gedaan)</a:t>
+            </a:r>
+          </a:p>
+          <a:p>
+            <a:r>
+              <a:rPr lang="nl-BE" dirty="0" smtClean="0"/>
+              <a:t>3</a:t>
+            </a:r>
+            <a:r>
+              <a:rPr lang="nl-BE" baseline="30000" dirty="0" smtClean="0"/>
+              <a:t>e</a:t>
+            </a:r>
+            <a:r>
+              <a:rPr lang="nl-BE" dirty="0" smtClean="0"/>
+              <a:t> test:</a:t>
+            </a:r>
+            <a:r>
+              <a:rPr lang="nl-BE" baseline="0" dirty="0" smtClean="0"/>
+              <a:t> credits afchecken, user credit geven, snack order, check credit (</a:t>
+            </a:r>
+            <a:r>
+              <a:rPr lang="nl-BE" sz="1200" kern="1200" dirty="0" smtClean="0">
+                <a:solidFill>
+                  <a:schemeClr val="tx1"/>
+                </a:solidFill>
+                <a:latin typeface="+mn-lt"/>
+                <a:ea typeface="+mn-ea"/>
+                <a:cs typeface="+mn-cs"/>
+              </a:rPr>
+              <a:t>DoFixture)</a:t>
+            </a:r>
+            <a:endParaRPr lang="nl-BE" baseline="0" dirty="0" smtClean="0"/>
+          </a:p>
+          <a:p>
+            <a:pPr marL="0" marR="0" indent="0" algn="l" defTabSz="914400" rtl="0" eaLnBrk="1" fontAlgn="auto" latinLnBrk="0" hangingPunct="1">
+              <a:lnSpc>
+                <a:spcPct val="100000"/>
+              </a:lnSpc>
+              <a:spcBef>
+                <a:spcPts val="0"/>
+              </a:spcBef>
+              <a:spcAft>
+                <a:spcPts val="0"/>
+              </a:spcAft>
+              <a:buClrTx/>
+              <a:buSzTx/>
+              <a:buFontTx/>
+              <a:buNone/>
+              <a:tabLst/>
+              <a:defRPr/>
+            </a:pPr>
+            <a:r>
+              <a:rPr lang="nl-BE" baseline="0" dirty="0" smtClean="0"/>
+              <a:t>Structuur in Wiki? Geaccepteerde testen falen? Move naar acceptance suite.</a:t>
+            </a:r>
+          </a:p>
+          <a:p>
+            <a:r>
+              <a:rPr lang="nl-BE" dirty="0" smtClean="0"/>
+              <a:t>Integratie van Agile</a:t>
+            </a:r>
+            <a:r>
+              <a:rPr lang="nl-BE" baseline="0" dirty="0" smtClean="0"/>
+              <a:t> Acceptance Testing in iteratie.</a:t>
+            </a:r>
+          </a:p>
+          <a:p>
+            <a:r>
+              <a:rPr lang="nl-BE" baseline="0" dirty="0" smtClean="0"/>
+              <a:t>4</a:t>
+            </a:r>
+            <a:r>
+              <a:rPr lang="nl-BE" baseline="30000" dirty="0" smtClean="0"/>
+              <a:t>e</a:t>
+            </a:r>
+            <a:r>
+              <a:rPr lang="nl-BE" baseline="0" dirty="0" smtClean="0"/>
+              <a:t> test: inloggen van een user (ActionFixture)</a:t>
             </a:r>
             <a:endParaRPr lang="nl-BE" dirty="0"/>
           </a:p>
@@ -1013,48 +1089,25 @@
           </a:bodyPr>
           <a:lstStyle/>
           <a:p>
+            <a:pPr lvl="1">
+              <a:buFontTx/>
+              <a:buChar char="-"/>
+            </a:pPr>
+            <a:endParaRPr lang="nl-BE" baseline="0" dirty="0" smtClean="0"/>
+          </a:p>
+          <a:p>
             <a:pPr>
               <a:buFontTx/>
               <a:buChar char="-"/>
             </a:pPr>
-            <a:r>
-              <a:rPr lang="nl-BE" dirty="0" smtClean="0"/>
-              <a:t>Rode</a:t>
-            </a:r>
-            <a:r>
-              <a:rPr lang="nl-BE" baseline="0" dirty="0" smtClean="0"/>
-              <a:t> testen toevoegen aan groenen</a:t>
-            </a:r>
+            <a:endParaRPr lang="nl-BE" baseline="0" dirty="0" smtClean="0"/>
           </a:p>
           <a:p>
             <a:pPr>
               <a:buFontTx/>
               <a:buChar char="-"/>
             </a:pPr>
-            <a:r>
-              <a:rPr lang="nl-BE" baseline="0" dirty="0" smtClean="0"/>
-              <a:t>Groenen zijn geaccepteerd – alarm! Awereness!</a:t>
-            </a:r>
-          </a:p>
-          <a:p>
-            <a:pPr>
-              <a:buFontTx/>
-              <a:buChar char="-"/>
-            </a:pPr>
-            <a:r>
-              <a:rPr lang="nl-BE" baseline="0" dirty="0" smtClean="0"/>
-              <a:t>Build should fail by regression tests, not by Work In Progress.</a:t>
-            </a:r>
-          </a:p>
-          <a:p>
-            <a:pPr>
-              <a:buFontTx/>
-              <a:buChar char="-"/>
-            </a:pPr>
-            <a:r>
-              <a:rPr lang="nl-BE" baseline="0" dirty="0" smtClean="0"/>
-              <a:t>Should we demo build integration? Ask the audience</a:t>
-            </a:r>
+            <a:endParaRPr lang="nl-BE" dirty="0" smtClean="0"/>
           </a:p>
         </p:txBody>
       </p:sp>
@@ -1232,7 +1285,25 @@
           </a:bodyPr>
           <a:lstStyle/>
           <a:p>
-            <a:endParaRPr lang="nl-BE" dirty="0"/>
+            <a:pPr lvl="1">
+              <a:buFontTx/>
+              <a:buChar char="-"/>
+            </a:pPr>
+            <a:endParaRPr lang="nl-BE" baseline="0" dirty="0" smtClean="0"/>
+          </a:p>
+          <a:p>
+            <a:pPr>
+              <a:buFontTx/>
+              <a:buChar char="-"/>
+            </a:pPr>
+            <a:endParaRPr lang="nl-BE" baseline="0" dirty="0" smtClean="0"/>
+          </a:p>
+          <a:p>
+            <a:pPr>
+              <a:buFontTx/>
+              <a:buChar char="-"/>
+            </a:pPr>
+            <a:endParaRPr lang="nl-BE" dirty="0" smtClean="0"/>
           </a:p>
         </p:txBody>
       </p:sp>
@@ -1314,7 +1385,48 @@
           </a:bodyPr>
           <a:lstStyle/>
           <a:p>
-            <a:endParaRPr lang="nl-BE" dirty="0"/>
+            <a:pPr>
+              <a:buFontTx/>
+              <a:buChar char="-"/>
+            </a:pPr>
+            <a:r>
+              <a:rPr lang="nl-BE" dirty="0" smtClean="0"/>
+              <a:t>Rode</a:t>
+            </a:r>
+            <a:r>
+              <a:rPr lang="nl-BE" baseline="0" dirty="0" smtClean="0"/>
+              <a:t> testen toevoegen aan groenen</a:t>
+            </a:r>
+          </a:p>
+          <a:p>
+            <a:pPr>
+              <a:buFontTx/>
+              <a:buChar char="-"/>
+            </a:pPr>
+            <a:r>
+              <a:rPr lang="nl-BE" baseline="0" dirty="0" smtClean="0"/>
+              <a:t>Groenen zijn geaccepteerd – alarm! Awereness!</a:t>
+            </a:r>
+          </a:p>
+          <a:p>
+            <a:pPr>
+              <a:buFontTx/>
+              <a:buChar char="-"/>
+            </a:pPr>
+            <a:r>
+              <a:rPr lang="nl-BE" baseline="0" dirty="0" smtClean="0"/>
+              <a:t>Build should fail by regression tests, not by Work In Progress.</a:t>
+            </a:r>
+          </a:p>
+          <a:p>
+            <a:pPr>
+              <a:buFontTx/>
+              <a:buChar char="-"/>
+            </a:pPr>
+            <a:r>
+              <a:rPr lang="nl-BE" baseline="0" dirty="0" smtClean="0"/>
+              <a:t>Should we demo build integration? Ask the audience</a:t>
+            </a:r>
           </a:p>
         </p:txBody>
       </p:sp>
@@ -1396,6 +1508,20 @@
           </a:bodyPr>
           <a:lstStyle/>
           <a:p>
+            <a:r>
+              <a:rPr lang="nl-BE" dirty="0" smtClean="0"/>
+              <a:t>Automated</a:t>
+            </a:r>
+            <a:r>
+              <a:rPr lang="nl-BE" baseline="0" dirty="0" smtClean="0"/>
+              <a:t> Build (vroeger-&gt; op einde iteratie)</a:t>
+            </a:r>
+          </a:p>
+          <a:p>
+            <a:r>
+              <a:rPr lang="nl-BE" baseline="0" dirty="0" smtClean="0"/>
+              <a:t>CI Environment (evt te schrappen)</a:t>
+            </a:r>
             <a:endParaRPr lang="nl-BE" dirty="0"/>
           </a:p>
         </p:txBody>
@@ -1596,6 +1722,252 @@
 </p:notes>
 </file>
 
+<file path=ppt/notesSlides/notesSlide20.xml><?xml version="1.0" encoding="utf-8"?>
+<p:notes xmlns:a="http://schemas.openxmlformats.org/drawingml/2006/main" xmlns:r="http://schemas.openxmlformats.org/officeDocument/2006/relationships" xmlns:p="http://schemas.openxmlformats.org/presentationml/2006/main">
+  <p:cSld>
+    <p:spTree>
+      <p:nvGrpSpPr>
+        <p:cNvPr id="1" name=""/>
+        <p:cNvGrpSpPr/>
+        <p:nvPr/>
+      </p:nvGrpSpPr>
+      <p:grpSpPr>
+        <a:xfrm>
+          <a:off x="0" y="0"/>
+          <a:ext cx="0" cy="0"/>
+          <a:chOff x="0" y="0"/>
+          <a:chExt cx="0" cy="0"/>
+        </a:xfrm>
+      </p:grpSpPr>
+      <p:sp>
+        <p:nvSpPr>
+          <p:cNvPr id="2" name="Slide Image Placeholder 1"/>
+          <p:cNvSpPr>
+            <a:spLocks noGrp="1" noRot="1" noChangeAspect="1"/>
+          </p:cNvSpPr>
+          <p:nvPr>
+            <p:ph type="sldImg"/>
+          </p:nvPr>
+        </p:nvSpPr>
+        <p:spPr/>
+      </p:sp>
+      <p:sp>
+        <p:nvSpPr>
+          <p:cNvPr id="3" name="Notes Placeholder 2"/>
+          <p:cNvSpPr>
+            <a:spLocks noGrp="1"/>
+          </p:cNvSpPr>
+          <p:nvPr>
+            <p:ph type="body" idx="1"/>
+          </p:nvPr>
+        </p:nvSpPr>
+        <p:spPr/>
+        <p:txBody>
+          <a:bodyPr>
+            <a:normAutofit/>
+          </a:bodyPr>
+          <a:lstStyle/>
+          <a:p>
+            <a:endParaRPr lang="nl-BE" dirty="0"/>
+          </a:p>
+        </p:txBody>
+      </p:sp>
+      <p:sp>
+        <p:nvSpPr>
+          <p:cNvPr id="4" name="Slide Number Placeholder 3"/>
+          <p:cNvSpPr>
+            <a:spLocks noGrp="1"/>
+          </p:cNvSpPr>
+          <p:nvPr>
+            <p:ph type="sldNum" sz="quarter" idx="10"/>
+          </p:nvPr>
+        </p:nvSpPr>
+        <p:spPr/>
+        <p:txBody>
+          <a:bodyPr/>
+          <a:lstStyle/>
+          <a:p>
+            <a:fld id="{A95F721D-B08F-41E9-83C2-423A43044BB2}" type="slidenum">
+              <a:rPr lang="nl-BE" smtClean="0"/>
+              <a:pPr/>
+              <a:t>26</a:t>
+            </a:fld>
+            <a:endParaRPr lang="nl-BE"/>
+          </a:p>
+        </p:txBody>
+      </p:sp>
+    </p:spTree>
+  </p:cSld>
+  <p:clrMapOvr>
+    <a:masterClrMapping/>
+  </p:clrMapOvr>
+</p:notes>
+</file>
+
+<file path=ppt/notesSlides/notesSlide21.xml><?xml version="1.0" encoding="utf-8"?>
+<p:notes xmlns:a="http://schemas.openxmlformats.org/drawingml/2006/main" xmlns:r="http://schemas.openxmlformats.org/officeDocument/2006/relationships" xmlns:p="http://schemas.openxmlformats.org/presentationml/2006/main">
+  <p:cSld>
+    <p:spTree>
+      <p:nvGrpSpPr>
+        <p:cNvPr id="1" name=""/>
+        <p:cNvGrpSpPr/>
+        <p:nvPr/>
+      </p:nvGrpSpPr>
+      <p:grpSpPr>
+        <a:xfrm>
+          <a:off x="0" y="0"/>
+          <a:ext cx="0" cy="0"/>
+          <a:chOff x="0" y="0"/>
+          <a:chExt cx="0" cy="0"/>
+        </a:xfrm>
+      </p:grpSpPr>
+      <p:sp>
+        <p:nvSpPr>
+          <p:cNvPr id="2" name="Slide Image Placeholder 1"/>
+          <p:cNvSpPr>
+            <a:spLocks noGrp="1" noRot="1" noChangeAspect="1"/>
+          </p:cNvSpPr>
+          <p:nvPr>
+            <p:ph type="sldImg"/>
+          </p:nvPr>
+        </p:nvSpPr>
+        <p:spPr/>
+      </p:sp>
+      <p:sp>
+        <p:nvSpPr>
+          <p:cNvPr id="3" name="Notes Placeholder 2"/>
+          <p:cNvSpPr>
+            <a:spLocks noGrp="1"/>
+          </p:cNvSpPr>
+          <p:nvPr>
+            <p:ph type="body" idx="1"/>
+          </p:nvPr>
+        </p:nvSpPr>
+        <p:spPr/>
+        <p:txBody>
+          <a:bodyPr>
+            <a:normAutofit/>
+          </a:bodyPr>
+          <a:lstStyle/>
+          <a:p>
+            <a:endParaRPr lang="nl-BE" dirty="0"/>
+          </a:p>
+        </p:txBody>
+      </p:sp>
+      <p:sp>
+        <p:nvSpPr>
+          <p:cNvPr id="4" name="Slide Number Placeholder 3"/>
+          <p:cNvSpPr>
+            <a:spLocks noGrp="1"/>
+          </p:cNvSpPr>
+          <p:nvPr>
+            <p:ph type="sldNum" sz="quarter" idx="10"/>
+          </p:nvPr>
+        </p:nvSpPr>
+        <p:spPr/>
+        <p:txBody>
+          <a:bodyPr/>
+          <a:lstStyle/>
+          <a:p>
+            <a:fld id="{A95F721D-B08F-41E9-83C2-423A43044BB2}" type="slidenum">
+              <a:rPr lang="nl-BE" smtClean="0"/>
+              <a:pPr/>
+              <a:t>27</a:t>
+            </a:fld>
+            <a:endParaRPr lang="nl-BE"/>
+          </a:p>
+        </p:txBody>
+      </p:sp>
+    </p:spTree>
+  </p:cSld>
+  <p:clrMapOvr>
+    <a:masterClrMapping/>
+  </p:clrMapOvr>
+</p:notes>
+</file>
+
+<file path=ppt/notesSlides/notesSlide22.xml><?xml version="1.0" encoding="utf-8"?>
+<p:notes xmlns:a="http://schemas.openxmlformats.org/drawingml/2006/main" xmlns:r="http://schemas.openxmlformats.org/officeDocument/2006/relationships" xmlns:p="http://schemas.openxmlformats.org/presentationml/2006/main">
+  <p:cSld>
+    <p:spTree>
+      <p:nvGrpSpPr>
+        <p:cNvPr id="1" name=""/>
+        <p:cNvGrpSpPr/>
+        <p:nvPr/>
+      </p:nvGrpSpPr>
+      <p:grpSpPr>
+        <a:xfrm>
+          <a:off x="0" y="0"/>
+          <a:ext cx="0" cy="0"/>
+          <a:chOff x="0" y="0"/>
+          <a:chExt cx="0" cy="0"/>
+        </a:xfrm>
+      </p:grpSpPr>
+      <p:sp>
+        <p:nvSpPr>
+          <p:cNvPr id="2" name="Slide Image Placeholder 1"/>
+          <p:cNvSpPr>
+            <a:spLocks noGrp="1" noRot="1" noChangeAspect="1"/>
+          </p:cNvSpPr>
+          <p:nvPr>
+            <p:ph type="sldImg"/>
+          </p:nvPr>
+        </p:nvSpPr>
+        <p:spPr/>
+      </p:sp>
+      <p:sp>
+        <p:nvSpPr>
+          <p:cNvPr id="3" name="Notes Placeholder 2"/>
+          <p:cNvSpPr>
+            <a:spLocks noGrp="1"/>
+          </p:cNvSpPr>
+          <p:nvPr>
+            <p:ph type="body" idx="1"/>
+          </p:nvPr>
+        </p:nvSpPr>
+        <p:spPr/>
+        <p:txBody>
+          <a:bodyPr>
+            <a:normAutofit/>
+          </a:bodyPr>
+          <a:lstStyle/>
+          <a:p>
+            <a:endParaRPr lang="nl-BE" dirty="0"/>
+          </a:p>
+        </p:txBody>
+      </p:sp>
+      <p:sp>
+        <p:nvSpPr>
+          <p:cNvPr id="4" name="Slide Number Placeholder 3"/>
+          <p:cNvSpPr>
+            <a:spLocks noGrp="1"/>
+          </p:cNvSpPr>
+          <p:nvPr>
+            <p:ph type="sldNum" sz="quarter" idx="10"/>
+          </p:nvPr>
+        </p:nvSpPr>
+        <p:spPr/>
+        <p:txBody>
+          <a:bodyPr/>
+          <a:lstStyle/>
+          <a:p>
+            <a:fld id="{A95F721D-B08F-41E9-83C2-423A43044BB2}" type="slidenum">
+              <a:rPr lang="nl-BE" smtClean="0"/>
+              <a:pPr/>
+              <a:t>28</a:t>
+            </a:fld>
+            <a:endParaRPr lang="nl-BE"/>
+          </a:p>
+        </p:txBody>
+      </p:sp>
+    </p:spTree>
+  </p:cSld>
+  <p:clrMapOvr>
+    <a:masterClrMapping/>
+  </p:clrMapOvr>
+</p:notes>
+</file>
+
 <file path=ppt/notesSlides/notesSlide3.xml><?xml version="1.0" encoding="utf-8"?>
 <p:notes xmlns:a="http://schemas.openxmlformats.org/drawingml/2006/main" xmlns:r="http://schemas.openxmlformats.org/officeDocument/2006/relationships" xmlns:p="http://schemas.openxmlformats.org/presentationml/2006/main">
   <p:cSld>
@@ -2281,23 +2653,7 @@
           </a:bodyPr>
           <a:lstStyle/>
           <a:p>
-            <a:r>
-              <a:rPr lang="nl-BE" dirty="0" smtClean="0"/>
-              <a:t>Cards- Misschien moeten we een hands-on lab voorzien waarbij stap voor stap</a:t>
-            </a:r>
-            <a:r>
-              <a:rPr lang="nl-BE" baseline="0" dirty="0" smtClean="0"/>
-              <a:t> uitgelegd staat wat er dient te gebeuren.</a:t>
-            </a:r>
-          </a:p>
-          <a:p>
             <a:endParaRPr lang="nl-BE" baseline="0" dirty="0" smtClean="0"/>
-          </a:p>
-          <a:p>
-            <a:r>
-              <a:rPr lang="nl-BE" baseline="0" dirty="0" smtClean="0"/>
-              <a:t>Rood? Ik zit vast!</a:t>
-            </a:r>
           </a:p>
         </p:txBody>
       </p:sp>
@@ -2379,120 +2735,7 @@
           </a:bodyPr>
           <a:lstStyle/>
           <a:p>
-            <a:r>
-              <a:rPr lang="nl-BE" dirty="0" smtClean="0"/>
-              <a:t>1</a:t>
-            </a:r>
-            <a:r>
-              <a:rPr lang="nl-BE" baseline="30000" dirty="0" smtClean="0"/>
-              <a:t>e</a:t>
-            </a:r>
-            <a:r>
-              <a:rPr lang="nl-BE" dirty="0" smtClean="0"/>
-              <a:t> test: Snack order</a:t>
-            </a:r>
-            <a:r>
-              <a:rPr lang="nl-BE" baseline="0" dirty="0" smtClean="0"/>
-              <a:t> zonder credit, credit toevoegen, snack orderen (columnFixture)</a:t>
-            </a:r>
-          </a:p>
-          <a:p>
-            <a:r>
-              <a:rPr lang="nl-BE" baseline="0" dirty="0" smtClean="0"/>
-              <a:t>2</a:t>
-            </a:r>
-            <a:r>
-              <a:rPr lang="nl-BE" baseline="30000" dirty="0" smtClean="0"/>
-              <a:t>e</a:t>
-            </a:r>
-            <a:r>
-              <a:rPr lang="nl-BE" baseline="0" dirty="0" smtClean="0"/>
-              <a:t> test: current orders opvragen (blanco) – order plaatsen (hergebruik bovenste fixture) – orders opvragen (rowfixture &amp; setup: orders leegmaken+credits op 0)</a:t>
-            </a:r>
-          </a:p>
-          <a:p>
-            <a:r>
-              <a:rPr lang="nl-BE" baseline="0" dirty="0" smtClean="0"/>
-              <a:t>Acceptatie door PO (iteratie gedaan)</a:t>
-            </a:r>
-          </a:p>
-          <a:p>
-            <a:r>
-              <a:rPr lang="nl-BE" dirty="0" smtClean="0"/>
-              <a:t>3</a:t>
-            </a:r>
-            <a:r>
-              <a:rPr lang="nl-BE" baseline="30000" dirty="0" smtClean="0"/>
-              <a:t>e</a:t>
-            </a:r>
-            <a:r>
-              <a:rPr lang="nl-BE" dirty="0" smtClean="0"/>
-              <a:t> test:</a:t>
-            </a:r>
-            <a:r>
-              <a:rPr lang="nl-BE" baseline="0" dirty="0" smtClean="0"/>
-              <a:t> credits afchecken, user credit geven, snack order, check credit (</a:t>
-            </a:r>
-            <a:r>
-              <a:rPr lang="nl-BE" sz="1200" kern="1200" dirty="0" smtClean="0">
-                <a:solidFill>
-                  <a:schemeClr val="tx1"/>
-                </a:solidFill>
-                <a:latin typeface="+mn-lt"/>
-                <a:ea typeface="+mn-ea"/>
-                <a:cs typeface="+mn-cs"/>
-              </a:rPr>
-              <a:t>DoFixture)</a:t>
-            </a:r>
             <a:endParaRPr lang="nl-BE" baseline="0" dirty="0" smtClean="0"/>
-          </a:p>
-          <a:p>
-            <a:pPr marL="0" marR="0" indent="0" algn="l" defTabSz="914400" rtl="0" eaLnBrk="1" fontAlgn="auto" latinLnBrk="0" hangingPunct="1">
-              <a:lnSpc>
-                <a:spcPct val="100000"/>
-              </a:lnSpc>
-              <a:spcBef>
-                <a:spcPts val="0"/>
-              </a:spcBef>
-              <a:spcAft>
-                <a:spcPts val="0"/>
-              </a:spcAft>
-              <a:buClrTx/>
-              <a:buSzTx/>
-              <a:buFontTx/>
-              <a:buNone/>
-              <a:tabLst/>
-              <a:defRPr/>
-            </a:pPr>
-            <a:r>
-              <a:rPr lang="nl-BE" baseline="0" dirty="0" smtClean="0"/>
-              <a:t>Structuur in Wiki? Geaccepteerde testen falen? Move naar acceptance suite.</a:t>
-            </a:r>
-          </a:p>
-          <a:p>
-            <a:r>
-              <a:rPr lang="nl-BE" dirty="0" smtClean="0"/>
-              <a:t>Integratie van Agile</a:t>
-            </a:r>
-            <a:r>
-              <a:rPr lang="nl-BE" baseline="0" dirty="0" smtClean="0"/>
-              <a:t> Acceptance Testing in iteratie.</a:t>
-            </a:r>
-          </a:p>
-          <a:p>
-            <a:r>
-              <a:rPr lang="nl-BE" baseline="0" dirty="0" smtClean="0"/>
-              <a:t>4</a:t>
-            </a:r>
-            <a:r>
-              <a:rPr lang="nl-BE" baseline="30000" dirty="0" smtClean="0"/>
-              <a:t>e</a:t>
-            </a:r>
-            <a:r>
-              <a:rPr lang="nl-BE" baseline="0" dirty="0" smtClean="0"/>
-              <a:t> test: inloggen van een user (ActionFixture)</a:t>
-            </a:r>
-            <a:endParaRPr lang="nl-BE" dirty="0"/>
           </a:p>
         </p:txBody>
       </p:sp>
@@ -8624,7 +8867,7 @@
         <p:spPr/>
         <p:txBody>
           <a:bodyPr>
-            <a:normAutofit lnSpcReduction="10000"/>
+            <a:normAutofit/>
           </a:bodyPr>
           <a:lstStyle/>
           <a:p>
@@ -8643,13 +8886,6 @@
             <a:r>
               <a:rPr lang="nl-BE" b="1" i="1" dirty="0" smtClean="0"/>
               <a:t>Setup Fitnesse</a:t>
-            </a:r>
-          </a:p>
-          <a:p>
-            <a:pPr marL="880110" lvl="1" indent="-514350"/>
-            <a:r>
-              <a:rPr lang="nl-BE" b="1" dirty="0" smtClean="0"/>
-              <a:t>Setup Fitnesse from the zip download</a:t>
             </a:r>
           </a:p>
           <a:p>
@@ -8732,6 +8968,1446 @@
 </file>
 
 <file path=ppt/slides/slide15.xml><?xml version="1.0" encoding="utf-8"?>
+<p:sld xmlns:a="http://schemas.openxmlformats.org/drawingml/2006/main" xmlns:r="http://schemas.openxmlformats.org/officeDocument/2006/relationships" xmlns:p="http://schemas.openxmlformats.org/presentationml/2006/main">
+  <p:cSld>
+    <p:spTree>
+      <p:nvGrpSpPr>
+        <p:cNvPr id="1" name=""/>
+        <p:cNvGrpSpPr/>
+        <p:nvPr/>
+      </p:nvGrpSpPr>
+      <p:grpSpPr>
+        <a:xfrm>
+          <a:off x="0" y="0"/>
+          <a:ext cx="0" cy="0"/>
+          <a:chOff x="0" y="0"/>
+          <a:chExt cx="0" cy="0"/>
+        </a:xfrm>
+      </p:grpSpPr>
+      <p:sp>
+        <p:nvSpPr>
+          <p:cNvPr id="2" name="Content Placeholder 1"/>
+          <p:cNvSpPr>
+            <a:spLocks noGrp="1"/>
+          </p:cNvSpPr>
+          <p:nvPr>
+            <p:ph idx="1"/>
+          </p:nvPr>
+        </p:nvSpPr>
+        <p:spPr/>
+        <p:txBody>
+          <a:bodyPr>
+            <a:normAutofit/>
+          </a:bodyPr>
+          <a:lstStyle/>
+          <a:p>
+            <a:pPr marL="880110" lvl="1" indent="-514350"/>
+            <a:endParaRPr lang="nl-BE" i="1" dirty="0" smtClean="0"/>
+          </a:p>
+          <a:p>
+            <a:pPr marL="624078" indent="-514350"/>
+            <a:r>
+              <a:rPr lang="nl-BE" dirty="0" smtClean="0"/>
+              <a:t>Latest version of FitNesse</a:t>
+            </a:r>
+          </a:p>
+          <a:p>
+            <a:pPr marL="880110" lvl="1" indent="-514350"/>
+            <a:r>
+              <a:rPr lang="en-US" sz="2000" u="sng" dirty="0" smtClean="0">
+                <a:hlinkClick r:id="rId3"/>
+              </a:rPr>
+              <a:t>http://</a:t>
+            </a:r>
+            <a:r>
+              <a:rPr lang="en-US" sz="2000" u="sng" dirty="0" smtClean="0">
+                <a:hlinkClick r:id="rId3"/>
+              </a:rPr>
+              <a:t>fitnesse.org/FitNesseDevelopment.DownLoad</a:t>
+            </a:r>
+            <a:endParaRPr lang="en-US" sz="2000" u="sng" dirty="0" smtClean="0"/>
+          </a:p>
+          <a:p>
+            <a:pPr marL="880110" lvl="1" indent="-514350"/>
+            <a:r>
+              <a:rPr lang="en-US" sz="2000" dirty="0" smtClean="0"/>
+              <a:t>Unzip into a directory of your choice (</a:t>
+            </a:r>
+            <a:r>
+              <a:rPr lang="en-US" sz="2000" dirty="0" err="1" smtClean="0"/>
+              <a:t>f.e</a:t>
+            </a:r>
+            <a:r>
+              <a:rPr lang="en-US" sz="2000" dirty="0" smtClean="0"/>
+              <a:t>. d:\Fitnesse)</a:t>
+            </a:r>
+            <a:endParaRPr lang="en-US" sz="2000" dirty="0" smtClean="0"/>
+          </a:p>
+          <a:p>
+            <a:pPr marL="624078" indent="-514350">
+              <a:buNone/>
+            </a:pPr>
+            <a:endParaRPr lang="nl-BE" dirty="0" smtClean="0"/>
+          </a:p>
+          <a:p>
+            <a:pPr marL="624078" indent="-514350"/>
+            <a:r>
+              <a:rPr lang="nl-BE" dirty="0" smtClean="0"/>
+              <a:t>.Net 2.0 testrunner</a:t>
+            </a:r>
+          </a:p>
+          <a:p>
+            <a:pPr marL="880110" lvl="1" indent="-514350"/>
+            <a:r>
+              <a:rPr lang="en-US" sz="2000" u="sng" dirty="0" smtClean="0">
+                <a:hlinkClick r:id="rId4"/>
+              </a:rPr>
+              <a:t>http://sourceforge.net/projects/fitnessedotnet</a:t>
+            </a:r>
+            <a:r>
+              <a:rPr lang="en-US" sz="2000" u="sng" dirty="0" smtClean="0">
+                <a:hlinkClick r:id="rId4"/>
+              </a:rPr>
+              <a:t>/</a:t>
+            </a:r>
+            <a:endParaRPr lang="en-US" sz="2000" u="sng" dirty="0" smtClean="0"/>
+          </a:p>
+          <a:p>
+            <a:pPr marL="880110" lvl="1" indent="-514350"/>
+            <a:r>
+              <a:rPr lang="en-US" sz="2000" dirty="0" smtClean="0"/>
+              <a:t>Unzip to d:\Fitnesse\Dotnet2</a:t>
+            </a:r>
+            <a:endParaRPr lang="nl-BE" sz="2000" dirty="0" smtClean="0"/>
+          </a:p>
+          <a:p>
+            <a:pPr marL="624078" indent="-514350"/>
+            <a:endParaRPr lang="nl-BE" dirty="0" smtClean="0"/>
+          </a:p>
+          <a:p>
+            <a:pPr marL="624078" indent="-514350"/>
+            <a:r>
+              <a:rPr lang="nl-BE" dirty="0" smtClean="0"/>
+              <a:t>Java Runtime Environment</a:t>
+            </a:r>
+          </a:p>
+          <a:p>
+            <a:pPr marL="880110" lvl="1" indent="-514350"/>
+            <a:r>
+              <a:rPr lang="nl-BE" sz="2000" dirty="0" smtClean="0">
+                <a:hlinkClick r:id="rId5"/>
+              </a:rPr>
+              <a:t>http://developers.sun.com/downloads/top.jsp</a:t>
+            </a:r>
+            <a:endParaRPr lang="nl-BE" sz="2000" dirty="0" smtClean="0"/>
+          </a:p>
+          <a:p>
+            <a:pPr marL="624078" indent="-514350"/>
+            <a:endParaRPr lang="nl-BE" i="1" dirty="0" smtClean="0"/>
+          </a:p>
+        </p:txBody>
+      </p:sp>
+      <p:sp>
+        <p:nvSpPr>
+          <p:cNvPr id="3" name="Title 2"/>
+          <p:cNvSpPr>
+            <a:spLocks noGrp="1"/>
+          </p:cNvSpPr>
+          <p:nvPr>
+            <p:ph type="title"/>
+          </p:nvPr>
+        </p:nvSpPr>
+        <p:spPr/>
+        <p:txBody>
+          <a:bodyPr>
+            <a:normAutofit fontScale="90000"/>
+          </a:bodyPr>
+          <a:lstStyle/>
+          <a:p>
+            <a:pPr algn="ctr"/>
+            <a:r>
+              <a:rPr lang="nl-BE" dirty="0" smtClean="0"/>
+              <a:t>FitNesse Setup (1/3)</a:t>
+            </a:r>
+            <a:r>
+              <a:rPr lang="nl-BE" sz="3600" dirty="0" smtClean="0"/>
+              <a:t/>
+            </a:r>
+            <a:br>
+              <a:rPr lang="nl-BE" sz="3600" dirty="0" smtClean="0"/>
+            </a:br>
+            <a:r>
+              <a:rPr lang="nl-BE" sz="3600" dirty="0" smtClean="0">
+                <a:solidFill>
+                  <a:schemeClr val="bg2">
+                    <a:lumMod val="50000"/>
+                  </a:schemeClr>
+                </a:solidFill>
+              </a:rPr>
+              <a:t>Getting the sources</a:t>
+            </a:r>
+            <a:endParaRPr lang="nl-BE" sz="3600" dirty="0"/>
+          </a:p>
+        </p:txBody>
+      </p:sp>
+      <p:pic>
+        <p:nvPicPr>
+          <p:cNvPr id="6" name="Picture 2"/>
+          <p:cNvPicPr>
+            <a:picLocks noChangeAspect="1" noChangeArrowheads="1"/>
+          </p:cNvPicPr>
+          <p:nvPr/>
+        </p:nvPicPr>
+        <p:blipFill>
+          <a:blip r:embed="rId6" cstate="print"/>
+          <a:srcRect/>
+          <a:stretch>
+            <a:fillRect/>
+          </a:stretch>
+        </p:blipFill>
+        <p:spPr bwMode="auto">
+          <a:xfrm>
+            <a:off x="7643834" y="241436"/>
+            <a:ext cx="1237258" cy="1258738"/>
+          </a:xfrm>
+          <a:prstGeom prst="rect">
+            <a:avLst/>
+          </a:prstGeom>
+          <a:noFill/>
+          <a:ln w="9525">
+            <a:noFill/>
+            <a:miter lim="800000"/>
+            <a:headEnd/>
+            <a:tailEnd/>
+          </a:ln>
+          <a:effectLst/>
+        </p:spPr>
+      </p:pic>
+      <p:pic>
+        <p:nvPicPr>
+          <p:cNvPr id="7" name="Picture 2"/>
+          <p:cNvPicPr>
+            <a:picLocks noChangeAspect="1" noChangeArrowheads="1"/>
+          </p:cNvPicPr>
+          <p:nvPr/>
+        </p:nvPicPr>
+        <p:blipFill>
+          <a:blip r:embed="rId6" cstate="print"/>
+          <a:srcRect/>
+          <a:stretch>
+            <a:fillRect/>
+          </a:stretch>
+        </p:blipFill>
+        <p:spPr bwMode="auto">
+          <a:xfrm>
+            <a:off x="500034" y="241436"/>
+            <a:ext cx="1237258" cy="1258738"/>
+          </a:xfrm>
+          <a:prstGeom prst="rect">
+            <a:avLst/>
+          </a:prstGeom>
+          <a:noFill/>
+          <a:ln w="9525">
+            <a:noFill/>
+            <a:miter lim="800000"/>
+            <a:headEnd/>
+            <a:tailEnd/>
+          </a:ln>
+          <a:effectLst/>
+        </p:spPr>
+      </p:pic>
+    </p:spTree>
+  </p:cSld>
+  <p:clrMapOvr>
+    <a:masterClrMapping/>
+  </p:clrMapOvr>
+  <p:timing>
+    <p:tnLst>
+      <p:par>
+        <p:cTn id="1" dur="indefinite" restart="never" nodeType="tmRoot">
+          <p:childTnLst>
+            <p:seq concurrent="1" nextAc="seek">
+              <p:cTn id="2" dur="indefinite" nodeType="mainSeq">
+                <p:childTnLst>
+                  <p:par>
+                    <p:cTn id="3" fill="hold">
+                      <p:stCondLst>
+                        <p:cond delay="indefinite"/>
+                      </p:stCondLst>
+                      <p:childTnLst>
+                        <p:par>
+                          <p:cTn id="4" fill="hold">
+                            <p:stCondLst>
+                              <p:cond delay="0"/>
+                            </p:stCondLst>
+                            <p:childTnLst>
+                              <p:par>
+                                <p:cTn id="5" presetID="1" presetClass="entr" presetSubtype="0" fill="hold" nodeType="clickEffect">
+                                  <p:stCondLst>
+                                    <p:cond delay="0"/>
+                                  </p:stCondLst>
+                                  <p:childTnLst>
+                                    <p:set>
+                                      <p:cBhvr>
+                                        <p:cTn id="6" dur="1" fill="hold">
+                                          <p:stCondLst>
+                                            <p:cond delay="0"/>
+                                          </p:stCondLst>
+                                        </p:cTn>
+                                        <p:tgtEl>
+                                          <p:spTgt spid="2">
+                                            <p:txEl>
+                                              <p:pRg st="1" end="1"/>
+                                            </p:txEl>
+                                          </p:spTgt>
+                                        </p:tgtEl>
+                                        <p:attrNameLst>
+                                          <p:attrName>style.visibility</p:attrName>
+                                        </p:attrNameLst>
+                                      </p:cBhvr>
+                                      <p:to>
+                                        <p:strVal val="visible"/>
+                                      </p:to>
+                                    </p:set>
+                                  </p:childTnLst>
+                                </p:cTn>
+                              </p:par>
+                              <p:par>
+                                <p:cTn id="7" presetID="1" presetClass="entr" presetSubtype="0" fill="hold" nodeType="withEffect">
+                                  <p:stCondLst>
+                                    <p:cond delay="0"/>
+                                  </p:stCondLst>
+                                  <p:childTnLst>
+                                    <p:set>
+                                      <p:cBhvr>
+                                        <p:cTn id="8" dur="1" fill="hold">
+                                          <p:stCondLst>
+                                            <p:cond delay="0"/>
+                                          </p:stCondLst>
+                                        </p:cTn>
+                                        <p:tgtEl>
+                                          <p:spTgt spid="2">
+                                            <p:txEl>
+                                              <p:pRg st="2" end="2"/>
+                                            </p:txEl>
+                                          </p:spTgt>
+                                        </p:tgtEl>
+                                        <p:attrNameLst>
+                                          <p:attrName>style.visibility</p:attrName>
+                                        </p:attrNameLst>
+                                      </p:cBhvr>
+                                      <p:to>
+                                        <p:strVal val="visible"/>
+                                      </p:to>
+                                    </p:set>
+                                  </p:childTnLst>
+                                </p:cTn>
+                              </p:par>
+                              <p:par>
+                                <p:cTn id="9" presetID="1" presetClass="entr" presetSubtype="0" fill="hold" nodeType="withEffect">
+                                  <p:stCondLst>
+                                    <p:cond delay="0"/>
+                                  </p:stCondLst>
+                                  <p:childTnLst>
+                                    <p:set>
+                                      <p:cBhvr>
+                                        <p:cTn id="10" dur="1" fill="hold">
+                                          <p:stCondLst>
+                                            <p:cond delay="0"/>
+                                          </p:stCondLst>
+                                        </p:cTn>
+                                        <p:tgtEl>
+                                          <p:spTgt spid="2">
+                                            <p:txEl>
+                                              <p:pRg st="3" end="3"/>
+                                            </p:txEl>
+                                          </p:spTgt>
+                                        </p:tgtEl>
+                                        <p:attrNameLst>
+                                          <p:attrName>style.visibility</p:attrName>
+                                        </p:attrNameLst>
+                                      </p:cBhvr>
+                                      <p:to>
+                                        <p:strVal val="visible"/>
+                                      </p:to>
+                                    </p:set>
+                                  </p:childTnLst>
+                                </p:cTn>
+                              </p:par>
+                            </p:childTnLst>
+                          </p:cTn>
+                        </p:par>
+                      </p:childTnLst>
+                    </p:cTn>
+                  </p:par>
+                  <p:par>
+                    <p:cTn id="11" fill="hold">
+                      <p:stCondLst>
+                        <p:cond delay="indefinite"/>
+                      </p:stCondLst>
+                      <p:childTnLst>
+                        <p:par>
+                          <p:cTn id="12" fill="hold">
+                            <p:stCondLst>
+                              <p:cond delay="0"/>
+                            </p:stCondLst>
+                            <p:childTnLst>
+                              <p:par>
+                                <p:cTn id="13" presetID="1" presetClass="entr" presetSubtype="0" fill="hold" nodeType="clickEffect">
+                                  <p:stCondLst>
+                                    <p:cond delay="0"/>
+                                  </p:stCondLst>
+                                  <p:childTnLst>
+                                    <p:set>
+                                      <p:cBhvr>
+                                        <p:cTn id="14" dur="1" fill="hold">
+                                          <p:stCondLst>
+                                            <p:cond delay="0"/>
+                                          </p:stCondLst>
+                                        </p:cTn>
+                                        <p:tgtEl>
+                                          <p:spTgt spid="2">
+                                            <p:txEl>
+                                              <p:pRg st="5" end="5"/>
+                                            </p:txEl>
+                                          </p:spTgt>
+                                        </p:tgtEl>
+                                        <p:attrNameLst>
+                                          <p:attrName>style.visibility</p:attrName>
+                                        </p:attrNameLst>
+                                      </p:cBhvr>
+                                      <p:to>
+                                        <p:strVal val="visible"/>
+                                      </p:to>
+                                    </p:set>
+                                  </p:childTnLst>
+                                </p:cTn>
+                              </p:par>
+                              <p:par>
+                                <p:cTn id="15" presetID="1" presetClass="entr" presetSubtype="0" fill="hold" nodeType="withEffect">
+                                  <p:stCondLst>
+                                    <p:cond delay="0"/>
+                                  </p:stCondLst>
+                                  <p:childTnLst>
+                                    <p:set>
+                                      <p:cBhvr>
+                                        <p:cTn id="16" dur="1" fill="hold">
+                                          <p:stCondLst>
+                                            <p:cond delay="0"/>
+                                          </p:stCondLst>
+                                        </p:cTn>
+                                        <p:tgtEl>
+                                          <p:spTgt spid="2">
+                                            <p:txEl>
+                                              <p:pRg st="6" end="6"/>
+                                            </p:txEl>
+                                          </p:spTgt>
+                                        </p:tgtEl>
+                                        <p:attrNameLst>
+                                          <p:attrName>style.visibility</p:attrName>
+                                        </p:attrNameLst>
+                                      </p:cBhvr>
+                                      <p:to>
+                                        <p:strVal val="visible"/>
+                                      </p:to>
+                                    </p:set>
+                                  </p:childTnLst>
+                                </p:cTn>
+                              </p:par>
+                              <p:par>
+                                <p:cTn id="17" presetID="1" presetClass="entr" presetSubtype="0" fill="hold" nodeType="withEffect">
+                                  <p:stCondLst>
+                                    <p:cond delay="0"/>
+                                  </p:stCondLst>
+                                  <p:childTnLst>
+                                    <p:set>
+                                      <p:cBhvr>
+                                        <p:cTn id="18" dur="1" fill="hold">
+                                          <p:stCondLst>
+                                            <p:cond delay="0"/>
+                                          </p:stCondLst>
+                                        </p:cTn>
+                                        <p:tgtEl>
+                                          <p:spTgt spid="2">
+                                            <p:txEl>
+                                              <p:pRg st="7" end="7"/>
+                                            </p:txEl>
+                                          </p:spTgt>
+                                        </p:tgtEl>
+                                        <p:attrNameLst>
+                                          <p:attrName>style.visibility</p:attrName>
+                                        </p:attrNameLst>
+                                      </p:cBhvr>
+                                      <p:to>
+                                        <p:strVal val="visible"/>
+                                      </p:to>
+                                    </p:set>
+                                  </p:childTnLst>
+                                </p:cTn>
+                              </p:par>
+                            </p:childTnLst>
+                          </p:cTn>
+                        </p:par>
+                      </p:childTnLst>
+                    </p:cTn>
+                  </p:par>
+                  <p:par>
+                    <p:cTn id="19" fill="hold">
+                      <p:stCondLst>
+                        <p:cond delay="indefinite"/>
+                      </p:stCondLst>
+                      <p:childTnLst>
+                        <p:par>
+                          <p:cTn id="20" fill="hold">
+                            <p:stCondLst>
+                              <p:cond delay="0"/>
+                            </p:stCondLst>
+                            <p:childTnLst>
+                              <p:par>
+                                <p:cTn id="21" presetID="1" presetClass="entr" presetSubtype="0" fill="hold" nodeType="clickEffect">
+                                  <p:stCondLst>
+                                    <p:cond delay="0"/>
+                                  </p:stCondLst>
+                                  <p:childTnLst>
+                                    <p:set>
+                                      <p:cBhvr>
+                                        <p:cTn id="22" dur="1" fill="hold">
+                                          <p:stCondLst>
+                                            <p:cond delay="0"/>
+                                          </p:stCondLst>
+                                        </p:cTn>
+                                        <p:tgtEl>
+                                          <p:spTgt spid="2">
+                                            <p:txEl>
+                                              <p:pRg st="9" end="9"/>
+                                            </p:txEl>
+                                          </p:spTgt>
+                                        </p:tgtEl>
+                                        <p:attrNameLst>
+                                          <p:attrName>style.visibility</p:attrName>
+                                        </p:attrNameLst>
+                                      </p:cBhvr>
+                                      <p:to>
+                                        <p:strVal val="visible"/>
+                                      </p:to>
+                                    </p:set>
+                                  </p:childTnLst>
+                                </p:cTn>
+                              </p:par>
+                              <p:par>
+                                <p:cTn id="23" presetID="1" presetClass="entr" presetSubtype="0" fill="hold" nodeType="withEffect">
+                                  <p:stCondLst>
+                                    <p:cond delay="0"/>
+                                  </p:stCondLst>
+                                  <p:childTnLst>
+                                    <p:set>
+                                      <p:cBhvr>
+                                        <p:cTn id="24" dur="1" fill="hold">
+                                          <p:stCondLst>
+                                            <p:cond delay="0"/>
+                                          </p:stCondLst>
+                                        </p:cTn>
+                                        <p:tgtEl>
+                                          <p:spTgt spid="2">
+                                            <p:txEl>
+                                              <p:pRg st="10" end="10"/>
+                                            </p:txEl>
+                                          </p:spTgt>
+                                        </p:tgtEl>
+                                        <p:attrNameLst>
+                                          <p:attrName>style.visibility</p:attrName>
+                                        </p:attrNameLst>
+                                      </p:cBhvr>
+                                      <p:to>
+                                        <p:strVal val="visible"/>
+                                      </p:to>
+                                    </p:set>
+                                  </p:childTnLst>
+                                </p:cTn>
+                              </p:par>
+                            </p:childTnLst>
+                          </p:cTn>
+                        </p:par>
+                      </p:childTnLst>
+                    </p:cTn>
+                  </p:par>
+                </p:childTnLst>
+              </p:cTn>
+              <p:prevCondLst>
+                <p:cond evt="onPrev" delay="0">
+                  <p:tgtEl>
+                    <p:sldTgt/>
+                  </p:tgtEl>
+                </p:cond>
+              </p:prevCondLst>
+              <p:nextCondLst>
+                <p:cond evt="onNext" delay="0">
+                  <p:tgtEl>
+                    <p:sldTgt/>
+                  </p:tgtEl>
+                </p:cond>
+              </p:nextCondLst>
+            </p:seq>
+          </p:childTnLst>
+        </p:cTn>
+      </p:par>
+    </p:tnLst>
+  </p:timing>
+</p:sld>
+</file>
+
+<file path=ppt/slides/slide16.xml><?xml version="1.0" encoding="utf-8"?>
+<p:sld xmlns:a="http://schemas.openxmlformats.org/drawingml/2006/main" xmlns:r="http://schemas.openxmlformats.org/officeDocument/2006/relationships" xmlns:p="http://schemas.openxmlformats.org/presentationml/2006/main">
+  <p:cSld>
+    <p:spTree>
+      <p:nvGrpSpPr>
+        <p:cNvPr id="1" name=""/>
+        <p:cNvGrpSpPr/>
+        <p:nvPr/>
+      </p:nvGrpSpPr>
+      <p:grpSpPr>
+        <a:xfrm>
+          <a:off x="0" y="0"/>
+          <a:ext cx="0" cy="0"/>
+          <a:chOff x="0" y="0"/>
+          <a:chExt cx="0" cy="0"/>
+        </a:xfrm>
+      </p:grpSpPr>
+      <p:sp>
+        <p:nvSpPr>
+          <p:cNvPr id="2" name="Content Placeholder 1"/>
+          <p:cNvSpPr>
+            <a:spLocks noGrp="1"/>
+          </p:cNvSpPr>
+          <p:nvPr>
+            <p:ph idx="1"/>
+          </p:nvPr>
+        </p:nvSpPr>
+        <p:spPr/>
+        <p:txBody>
+          <a:bodyPr>
+            <a:normAutofit/>
+          </a:bodyPr>
+          <a:lstStyle/>
+          <a:p>
+            <a:pPr marL="880110" lvl="1" indent="-514350"/>
+            <a:endParaRPr lang="nl-BE" i="1" dirty="0" smtClean="0"/>
+          </a:p>
+          <a:p>
+            <a:pPr marL="624078" indent="-514350"/>
+            <a:r>
+              <a:rPr lang="nl-BE" dirty="0" smtClean="0"/>
+              <a:t>Customize port FitNesse is running on</a:t>
+            </a:r>
+            <a:endParaRPr lang="nl-BE" dirty="0" smtClean="0"/>
+          </a:p>
+          <a:p>
+            <a:pPr marL="624078" indent="-514350"/>
+            <a:r>
+              <a:rPr lang="nl-BE" dirty="0" smtClean="0"/>
+              <a:t>Location of java.exe</a:t>
+            </a:r>
+            <a:endParaRPr lang="nl-BE" dirty="0" smtClean="0"/>
+          </a:p>
+          <a:p>
+            <a:pPr marL="624078" indent="-514350"/>
+            <a:r>
+              <a:rPr lang="nl-BE" dirty="0" smtClean="0"/>
+              <a:t>Optional: disable versioning system</a:t>
+            </a:r>
+          </a:p>
+          <a:p>
+            <a:pPr marL="624078" indent="-514350"/>
+            <a:endParaRPr lang="nl-BE" i="1" dirty="0" smtClean="0"/>
+          </a:p>
+          <a:p>
+            <a:pPr marL="624078" indent="-514350"/>
+            <a:r>
+              <a:rPr lang="nl-BE" dirty="0" smtClean="0"/>
+              <a:t>run.bat:</a:t>
+            </a:r>
+          </a:p>
+          <a:p>
+            <a:pPr marL="880110" lvl="1" indent="-514350"/>
+            <a:r>
+              <a:rPr lang="en-US" sz="1600" b="1" dirty="0" err="1" smtClean="0"/>
+              <a:t>jre</a:t>
+            </a:r>
+            <a:r>
+              <a:rPr lang="en-US" sz="1600" b="1" dirty="0" smtClean="0"/>
+              <a:t>\bin\</a:t>
+            </a:r>
+            <a:r>
+              <a:rPr lang="en-US" sz="1600" dirty="0" smtClean="0"/>
+              <a:t>java </a:t>
+            </a:r>
+            <a:r>
+              <a:rPr lang="en-US" sz="1600" dirty="0" smtClean="0"/>
+              <a:t>-jar fitnesse.jar %1 %2 %3 %4 %5 </a:t>
+            </a:r>
+            <a:r>
+              <a:rPr lang="en-US" sz="1600" b="1" dirty="0" smtClean="0"/>
+              <a:t>-p </a:t>
+            </a:r>
+            <a:r>
+              <a:rPr lang="en-US" sz="1600" b="1" dirty="0" smtClean="0"/>
+              <a:t>8888 –e 0</a:t>
+            </a:r>
+          </a:p>
+          <a:p>
+            <a:pPr marL="880110" lvl="1" indent="-514350"/>
+            <a:endParaRPr lang="en-US" sz="1600" b="1" dirty="0" smtClean="0"/>
+          </a:p>
+          <a:p>
+            <a:pPr marL="624078" indent="-514350"/>
+            <a:r>
+              <a:rPr lang="nl-BE" dirty="0" smtClean="0"/>
+              <a:t>stop.bat:</a:t>
+            </a:r>
+          </a:p>
+          <a:p>
+            <a:pPr marL="880110" lvl="1" indent="-514350"/>
+            <a:r>
+              <a:rPr lang="en-US" sz="1600" b="1" dirty="0" err="1" smtClean="0"/>
+              <a:t>jre</a:t>
+            </a:r>
+            <a:r>
+              <a:rPr lang="en-US" sz="1600" b="1" dirty="0" smtClean="0"/>
+              <a:t>\bin\</a:t>
+            </a:r>
+            <a:r>
+              <a:rPr lang="en-US" sz="1600" dirty="0" smtClean="0"/>
+              <a:t>java -cp fitnesse.jar </a:t>
+            </a:r>
+            <a:r>
+              <a:rPr lang="en-US" sz="1600" dirty="0" err="1" smtClean="0"/>
+              <a:t>fitnesse.Shutdown</a:t>
+            </a:r>
+            <a:r>
+              <a:rPr lang="en-US" sz="1600" dirty="0" smtClean="0"/>
+              <a:t> %1 %2 %3 %4 %5 –</a:t>
+            </a:r>
+            <a:r>
+              <a:rPr lang="en-US" sz="1600" b="1" dirty="0" smtClean="0"/>
+              <a:t>p 8888</a:t>
+            </a:r>
+            <a:endParaRPr lang="nl-BE" sz="1600" dirty="0" smtClean="0"/>
+          </a:p>
+          <a:p>
+            <a:pPr marL="624078" indent="-514350"/>
+            <a:endParaRPr lang="nl-BE" dirty="0" smtClean="0"/>
+          </a:p>
+        </p:txBody>
+      </p:sp>
+      <p:sp>
+        <p:nvSpPr>
+          <p:cNvPr id="3" name="Title 2"/>
+          <p:cNvSpPr>
+            <a:spLocks noGrp="1"/>
+          </p:cNvSpPr>
+          <p:nvPr>
+            <p:ph type="title"/>
+          </p:nvPr>
+        </p:nvSpPr>
+        <p:spPr/>
+        <p:txBody>
+          <a:bodyPr>
+            <a:normAutofit fontScale="90000"/>
+          </a:bodyPr>
+          <a:lstStyle/>
+          <a:p>
+            <a:pPr algn="ctr"/>
+            <a:r>
+              <a:rPr lang="nl-BE" dirty="0" smtClean="0"/>
+              <a:t>FitNesse Setup (2/3)</a:t>
+            </a:r>
+            <a:r>
+              <a:rPr lang="nl-BE" sz="3600" dirty="0" smtClean="0"/>
+              <a:t/>
+            </a:r>
+            <a:br>
+              <a:rPr lang="nl-BE" sz="3600" dirty="0" smtClean="0"/>
+            </a:br>
+            <a:r>
+              <a:rPr lang="nl-BE" sz="3600" dirty="0" smtClean="0">
+                <a:solidFill>
+                  <a:schemeClr val="bg2">
+                    <a:lumMod val="50000"/>
+                  </a:schemeClr>
+                </a:solidFill>
+              </a:rPr>
+              <a:t>Custmize run.bat / stop.bat</a:t>
+            </a:r>
+            <a:endParaRPr lang="nl-BE" sz="3600" dirty="0"/>
+          </a:p>
+        </p:txBody>
+      </p:sp>
+      <p:pic>
+        <p:nvPicPr>
+          <p:cNvPr id="6" name="Picture 2"/>
+          <p:cNvPicPr>
+            <a:picLocks noChangeAspect="1" noChangeArrowheads="1"/>
+          </p:cNvPicPr>
+          <p:nvPr/>
+        </p:nvPicPr>
+        <p:blipFill>
+          <a:blip r:embed="rId3" cstate="print"/>
+          <a:srcRect/>
+          <a:stretch>
+            <a:fillRect/>
+          </a:stretch>
+        </p:blipFill>
+        <p:spPr bwMode="auto">
+          <a:xfrm>
+            <a:off x="7643834" y="241436"/>
+            <a:ext cx="1237258" cy="1258738"/>
+          </a:xfrm>
+          <a:prstGeom prst="rect">
+            <a:avLst/>
+          </a:prstGeom>
+          <a:noFill/>
+          <a:ln w="9525">
+            <a:noFill/>
+            <a:miter lim="800000"/>
+            <a:headEnd/>
+            <a:tailEnd/>
+          </a:ln>
+          <a:effectLst/>
+        </p:spPr>
+      </p:pic>
+      <p:pic>
+        <p:nvPicPr>
+          <p:cNvPr id="7" name="Picture 2"/>
+          <p:cNvPicPr>
+            <a:picLocks noChangeAspect="1" noChangeArrowheads="1"/>
+          </p:cNvPicPr>
+          <p:nvPr/>
+        </p:nvPicPr>
+        <p:blipFill>
+          <a:blip r:embed="rId3" cstate="print"/>
+          <a:srcRect/>
+          <a:stretch>
+            <a:fillRect/>
+          </a:stretch>
+        </p:blipFill>
+        <p:spPr bwMode="auto">
+          <a:xfrm>
+            <a:off x="500034" y="241436"/>
+            <a:ext cx="1237258" cy="1258738"/>
+          </a:xfrm>
+          <a:prstGeom prst="rect">
+            <a:avLst/>
+          </a:prstGeom>
+          <a:noFill/>
+          <a:ln w="9525">
+            <a:noFill/>
+            <a:miter lim="800000"/>
+            <a:headEnd/>
+            <a:tailEnd/>
+          </a:ln>
+          <a:effectLst/>
+        </p:spPr>
+      </p:pic>
+    </p:spTree>
+  </p:cSld>
+  <p:clrMapOvr>
+    <a:masterClrMapping/>
+  </p:clrMapOvr>
+  <p:timing>
+    <p:tnLst>
+      <p:par>
+        <p:cTn id="1" dur="indefinite" restart="never" nodeType="tmRoot">
+          <p:childTnLst>
+            <p:seq concurrent="1" nextAc="seek">
+              <p:cTn id="2" dur="indefinite" nodeType="mainSeq">
+                <p:childTnLst>
+                  <p:par>
+                    <p:cTn id="3" fill="hold">
+                      <p:stCondLst>
+                        <p:cond delay="indefinite"/>
+                      </p:stCondLst>
+                      <p:childTnLst>
+                        <p:par>
+                          <p:cTn id="4" fill="hold">
+                            <p:stCondLst>
+                              <p:cond delay="0"/>
+                            </p:stCondLst>
+                            <p:childTnLst>
+                              <p:par>
+                                <p:cTn id="5" presetID="1" presetClass="entr" presetSubtype="0" fill="hold" nodeType="clickEffect">
+                                  <p:stCondLst>
+                                    <p:cond delay="0"/>
+                                  </p:stCondLst>
+                                  <p:childTnLst>
+                                    <p:set>
+                                      <p:cBhvr>
+                                        <p:cTn id="6" dur="1" fill="hold">
+                                          <p:stCondLst>
+                                            <p:cond delay="0"/>
+                                          </p:stCondLst>
+                                        </p:cTn>
+                                        <p:tgtEl>
+                                          <p:spTgt spid="2">
+                                            <p:txEl>
+                                              <p:pRg st="1" end="1"/>
+                                            </p:txEl>
+                                          </p:spTgt>
+                                        </p:tgtEl>
+                                        <p:attrNameLst>
+                                          <p:attrName>style.visibility</p:attrName>
+                                        </p:attrNameLst>
+                                      </p:cBhvr>
+                                      <p:to>
+                                        <p:strVal val="visible"/>
+                                      </p:to>
+                                    </p:set>
+                                  </p:childTnLst>
+                                </p:cTn>
+                              </p:par>
+                            </p:childTnLst>
+                          </p:cTn>
+                        </p:par>
+                      </p:childTnLst>
+                    </p:cTn>
+                  </p:par>
+                  <p:par>
+                    <p:cTn id="7" fill="hold">
+                      <p:stCondLst>
+                        <p:cond delay="indefinite"/>
+                      </p:stCondLst>
+                      <p:childTnLst>
+                        <p:par>
+                          <p:cTn id="8" fill="hold">
+                            <p:stCondLst>
+                              <p:cond delay="0"/>
+                            </p:stCondLst>
+                            <p:childTnLst>
+                              <p:par>
+                                <p:cTn id="9" presetID="1" presetClass="entr" presetSubtype="0" fill="hold" nodeType="clickEffect">
+                                  <p:stCondLst>
+                                    <p:cond delay="0"/>
+                                  </p:stCondLst>
+                                  <p:childTnLst>
+                                    <p:set>
+                                      <p:cBhvr>
+                                        <p:cTn id="10" dur="1" fill="hold">
+                                          <p:stCondLst>
+                                            <p:cond delay="0"/>
+                                          </p:stCondLst>
+                                        </p:cTn>
+                                        <p:tgtEl>
+                                          <p:spTgt spid="2">
+                                            <p:txEl>
+                                              <p:pRg st="2" end="2"/>
+                                            </p:txEl>
+                                          </p:spTgt>
+                                        </p:tgtEl>
+                                        <p:attrNameLst>
+                                          <p:attrName>style.visibility</p:attrName>
+                                        </p:attrNameLst>
+                                      </p:cBhvr>
+                                      <p:to>
+                                        <p:strVal val="visible"/>
+                                      </p:to>
+                                    </p:set>
+                                  </p:childTnLst>
+                                </p:cTn>
+                              </p:par>
+                            </p:childTnLst>
+                          </p:cTn>
+                        </p:par>
+                      </p:childTnLst>
+                    </p:cTn>
+                  </p:par>
+                  <p:par>
+                    <p:cTn id="11" fill="hold">
+                      <p:stCondLst>
+                        <p:cond delay="indefinite"/>
+                      </p:stCondLst>
+                      <p:childTnLst>
+                        <p:par>
+                          <p:cTn id="12" fill="hold">
+                            <p:stCondLst>
+                              <p:cond delay="0"/>
+                            </p:stCondLst>
+                            <p:childTnLst>
+                              <p:par>
+                                <p:cTn id="13" presetID="1" presetClass="entr" presetSubtype="0" fill="hold" nodeType="clickEffect">
+                                  <p:stCondLst>
+                                    <p:cond delay="0"/>
+                                  </p:stCondLst>
+                                  <p:childTnLst>
+                                    <p:set>
+                                      <p:cBhvr>
+                                        <p:cTn id="14" dur="1" fill="hold">
+                                          <p:stCondLst>
+                                            <p:cond delay="0"/>
+                                          </p:stCondLst>
+                                        </p:cTn>
+                                        <p:tgtEl>
+                                          <p:spTgt spid="2">
+                                            <p:txEl>
+                                              <p:pRg st="3" end="3"/>
+                                            </p:txEl>
+                                          </p:spTgt>
+                                        </p:tgtEl>
+                                        <p:attrNameLst>
+                                          <p:attrName>style.visibility</p:attrName>
+                                        </p:attrNameLst>
+                                      </p:cBhvr>
+                                      <p:to>
+                                        <p:strVal val="visible"/>
+                                      </p:to>
+                                    </p:set>
+                                  </p:childTnLst>
+                                </p:cTn>
+                              </p:par>
+                            </p:childTnLst>
+                          </p:cTn>
+                        </p:par>
+                      </p:childTnLst>
+                    </p:cTn>
+                  </p:par>
+                  <p:par>
+                    <p:cTn id="15" fill="hold">
+                      <p:stCondLst>
+                        <p:cond delay="indefinite"/>
+                      </p:stCondLst>
+                      <p:childTnLst>
+                        <p:par>
+                          <p:cTn id="16" fill="hold">
+                            <p:stCondLst>
+                              <p:cond delay="0"/>
+                            </p:stCondLst>
+                            <p:childTnLst>
+                              <p:par>
+                                <p:cTn id="17" presetID="1" presetClass="entr" presetSubtype="0" fill="hold" nodeType="clickEffect">
+                                  <p:stCondLst>
+                                    <p:cond delay="0"/>
+                                  </p:stCondLst>
+                                  <p:childTnLst>
+                                    <p:set>
+                                      <p:cBhvr>
+                                        <p:cTn id="18" dur="1" fill="hold">
+                                          <p:stCondLst>
+                                            <p:cond delay="0"/>
+                                          </p:stCondLst>
+                                        </p:cTn>
+                                        <p:tgtEl>
+                                          <p:spTgt spid="2">
+                                            <p:txEl>
+                                              <p:pRg st="5" end="5"/>
+                                            </p:txEl>
+                                          </p:spTgt>
+                                        </p:tgtEl>
+                                        <p:attrNameLst>
+                                          <p:attrName>style.visibility</p:attrName>
+                                        </p:attrNameLst>
+                                      </p:cBhvr>
+                                      <p:to>
+                                        <p:strVal val="visible"/>
+                                      </p:to>
+                                    </p:set>
+                                  </p:childTnLst>
+                                </p:cTn>
+                              </p:par>
+                              <p:par>
+                                <p:cTn id="19" presetID="1" presetClass="entr" presetSubtype="0" fill="hold" nodeType="withEffect">
+                                  <p:stCondLst>
+                                    <p:cond delay="0"/>
+                                  </p:stCondLst>
+                                  <p:childTnLst>
+                                    <p:set>
+                                      <p:cBhvr>
+                                        <p:cTn id="20" dur="1" fill="hold">
+                                          <p:stCondLst>
+                                            <p:cond delay="0"/>
+                                          </p:stCondLst>
+                                        </p:cTn>
+                                        <p:tgtEl>
+                                          <p:spTgt spid="2">
+                                            <p:txEl>
+                                              <p:pRg st="6" end="6"/>
+                                            </p:txEl>
+                                          </p:spTgt>
+                                        </p:tgtEl>
+                                        <p:attrNameLst>
+                                          <p:attrName>style.visibility</p:attrName>
+                                        </p:attrNameLst>
+                                      </p:cBhvr>
+                                      <p:to>
+                                        <p:strVal val="visible"/>
+                                      </p:to>
+                                    </p:set>
+                                  </p:childTnLst>
+                                </p:cTn>
+                              </p:par>
+                            </p:childTnLst>
+                          </p:cTn>
+                        </p:par>
+                      </p:childTnLst>
+                    </p:cTn>
+                  </p:par>
+                  <p:par>
+                    <p:cTn id="21" fill="hold">
+                      <p:stCondLst>
+                        <p:cond delay="indefinite"/>
+                      </p:stCondLst>
+                      <p:childTnLst>
+                        <p:par>
+                          <p:cTn id="22" fill="hold">
+                            <p:stCondLst>
+                              <p:cond delay="0"/>
+                            </p:stCondLst>
+                            <p:childTnLst>
+                              <p:par>
+                                <p:cTn id="23" presetID="1" presetClass="entr" presetSubtype="0" fill="hold" nodeType="clickEffect">
+                                  <p:stCondLst>
+                                    <p:cond delay="0"/>
+                                  </p:stCondLst>
+                                  <p:childTnLst>
+                                    <p:set>
+                                      <p:cBhvr>
+                                        <p:cTn id="24" dur="1" fill="hold">
+                                          <p:stCondLst>
+                                            <p:cond delay="0"/>
+                                          </p:stCondLst>
+                                        </p:cTn>
+                                        <p:tgtEl>
+                                          <p:spTgt spid="2">
+                                            <p:txEl>
+                                              <p:pRg st="8" end="8"/>
+                                            </p:txEl>
+                                          </p:spTgt>
+                                        </p:tgtEl>
+                                        <p:attrNameLst>
+                                          <p:attrName>style.visibility</p:attrName>
+                                        </p:attrNameLst>
+                                      </p:cBhvr>
+                                      <p:to>
+                                        <p:strVal val="visible"/>
+                                      </p:to>
+                                    </p:set>
+                                  </p:childTnLst>
+                                </p:cTn>
+                              </p:par>
+                              <p:par>
+                                <p:cTn id="25" presetID="1" presetClass="entr" presetSubtype="0" fill="hold" nodeType="withEffect">
+                                  <p:stCondLst>
+                                    <p:cond delay="0"/>
+                                  </p:stCondLst>
+                                  <p:childTnLst>
+                                    <p:set>
+                                      <p:cBhvr>
+                                        <p:cTn id="26" dur="1" fill="hold">
+                                          <p:stCondLst>
+                                            <p:cond delay="0"/>
+                                          </p:stCondLst>
+                                        </p:cTn>
+                                        <p:tgtEl>
+                                          <p:spTgt spid="2">
+                                            <p:txEl>
+                                              <p:pRg st="9" end="9"/>
+                                            </p:txEl>
+                                          </p:spTgt>
+                                        </p:tgtEl>
+                                        <p:attrNameLst>
+                                          <p:attrName>style.visibility</p:attrName>
+                                        </p:attrNameLst>
+                                      </p:cBhvr>
+                                      <p:to>
+                                        <p:strVal val="visible"/>
+                                      </p:to>
+                                    </p:set>
+                                  </p:childTnLst>
+                                </p:cTn>
+                              </p:par>
+                            </p:childTnLst>
+                          </p:cTn>
+                        </p:par>
+                      </p:childTnLst>
+                    </p:cTn>
+                  </p:par>
+                </p:childTnLst>
+              </p:cTn>
+              <p:prevCondLst>
+                <p:cond evt="onPrev" delay="0">
+                  <p:tgtEl>
+                    <p:sldTgt/>
+                  </p:tgtEl>
+                </p:cond>
+              </p:prevCondLst>
+              <p:nextCondLst>
+                <p:cond evt="onNext" delay="0">
+                  <p:tgtEl>
+                    <p:sldTgt/>
+                  </p:tgtEl>
+                </p:cond>
+              </p:nextCondLst>
+            </p:seq>
+          </p:childTnLst>
+        </p:cTn>
+      </p:par>
+    </p:tnLst>
+  </p:timing>
+</p:sld>
+</file>
+
+<file path=ppt/slides/slide17.xml><?xml version="1.0" encoding="utf-8"?>
+<p:sld xmlns:a="http://schemas.openxmlformats.org/drawingml/2006/main" xmlns:r="http://schemas.openxmlformats.org/officeDocument/2006/relationships" xmlns:p="http://schemas.openxmlformats.org/presentationml/2006/main">
+  <p:cSld>
+    <p:spTree>
+      <p:nvGrpSpPr>
+        <p:cNvPr id="1" name=""/>
+        <p:cNvGrpSpPr/>
+        <p:nvPr/>
+      </p:nvGrpSpPr>
+      <p:grpSpPr>
+        <a:xfrm>
+          <a:off x="0" y="0"/>
+          <a:ext cx="0" cy="0"/>
+          <a:chOff x="0" y="0"/>
+          <a:chExt cx="0" cy="0"/>
+        </a:xfrm>
+      </p:grpSpPr>
+      <p:sp>
+        <p:nvSpPr>
+          <p:cNvPr id="2" name="Content Placeholder 1"/>
+          <p:cNvSpPr>
+            <a:spLocks noGrp="1"/>
+          </p:cNvSpPr>
+          <p:nvPr>
+            <p:ph idx="1"/>
+          </p:nvPr>
+        </p:nvSpPr>
+        <p:spPr/>
+        <p:txBody>
+          <a:bodyPr>
+            <a:normAutofit/>
+          </a:bodyPr>
+          <a:lstStyle/>
+          <a:p>
+            <a:pPr marL="880110" lvl="1" indent="-514350"/>
+            <a:endParaRPr lang="nl-BE" i="1" dirty="0" smtClean="0"/>
+          </a:p>
+          <a:p>
+            <a:pPr marL="624078" indent="-514350"/>
+            <a:r>
+              <a:rPr lang="en-US" u="sng" dirty="0" smtClean="0">
+                <a:hlinkClick r:id="rId3"/>
+              </a:rPr>
+              <a:t>http://localhost:888/?edit</a:t>
+            </a:r>
+            <a:endParaRPr lang="nl-BE" dirty="0" smtClean="0"/>
+          </a:p>
+          <a:p>
+            <a:pPr marL="624078" indent="-514350"/>
+            <a:endParaRPr lang="nl-BE" dirty="0" smtClean="0"/>
+          </a:p>
+          <a:p>
+            <a:r>
+              <a:rPr lang="en-US" dirty="0" smtClean="0"/>
+              <a:t>!path classes</a:t>
+            </a:r>
+            <a:endParaRPr lang="nl-BE" dirty="0" smtClean="0"/>
+          </a:p>
+          <a:p>
+            <a:pPr>
+              <a:buNone/>
+            </a:pPr>
+            <a:r>
+              <a:rPr lang="en-US" dirty="0" smtClean="0"/>
+              <a:t>	!</a:t>
+            </a:r>
+            <a:r>
+              <a:rPr lang="en-US" dirty="0" smtClean="0"/>
+              <a:t>path fitnesse.jar</a:t>
+            </a:r>
+            <a:endParaRPr lang="nl-BE" dirty="0" smtClean="0"/>
+          </a:p>
+          <a:p>
+            <a:pPr>
+              <a:buNone/>
+            </a:pPr>
+            <a:r>
+              <a:rPr lang="en-US" dirty="0" smtClean="0"/>
+              <a:t> </a:t>
+            </a:r>
+            <a:endParaRPr lang="nl-BE" dirty="0" smtClean="0"/>
+          </a:p>
+          <a:p>
+            <a:pPr>
+              <a:buNone/>
+            </a:pPr>
+            <a:r>
+              <a:rPr lang="en-US" b="1" dirty="0" smtClean="0"/>
+              <a:t>	!</a:t>
+            </a:r>
+            <a:r>
+              <a:rPr lang="en-US" b="1" dirty="0" smtClean="0"/>
+              <a:t>path dotnet2\*.dll </a:t>
+            </a:r>
+            <a:endParaRPr lang="nl-BE" dirty="0" smtClean="0"/>
+          </a:p>
+          <a:p>
+            <a:pPr>
+              <a:buNone/>
+            </a:pPr>
+            <a:r>
+              <a:rPr lang="en-US" b="1" dirty="0" smtClean="0"/>
+              <a:t>	!</a:t>
+            </a:r>
+            <a:r>
+              <a:rPr lang="en-US" b="1" dirty="0" smtClean="0"/>
+              <a:t>define COMMAND_PATTERN {%m %p} </a:t>
+            </a:r>
+            <a:br>
+              <a:rPr lang="en-US" b="1" dirty="0" smtClean="0"/>
+            </a:br>
+            <a:r>
+              <a:rPr lang="en-US" b="1" dirty="0" smtClean="0"/>
+              <a:t>!define TEST_RUNNER {dotnet2\FitServer.exe} </a:t>
+            </a:r>
+            <a:br>
+              <a:rPr lang="en-US" b="1" dirty="0" smtClean="0"/>
+            </a:br>
+            <a:r>
+              <a:rPr lang="en-US" b="1" dirty="0" smtClean="0"/>
+              <a:t>!define PATH_SEPARATOR {;}</a:t>
+            </a:r>
+            <a:endParaRPr lang="nl-BE" dirty="0" smtClean="0"/>
+          </a:p>
+          <a:p>
+            <a:pPr marL="624078" indent="-514350"/>
+            <a:endParaRPr lang="nl-BE" dirty="0" smtClean="0"/>
+          </a:p>
+        </p:txBody>
+      </p:sp>
+      <p:sp>
+        <p:nvSpPr>
+          <p:cNvPr id="3" name="Title 2"/>
+          <p:cNvSpPr>
+            <a:spLocks noGrp="1"/>
+          </p:cNvSpPr>
+          <p:nvPr>
+            <p:ph type="title"/>
+          </p:nvPr>
+        </p:nvSpPr>
+        <p:spPr/>
+        <p:txBody>
+          <a:bodyPr>
+            <a:normAutofit fontScale="90000"/>
+          </a:bodyPr>
+          <a:lstStyle/>
+          <a:p>
+            <a:pPr algn="ctr"/>
+            <a:r>
+              <a:rPr lang="nl-BE" dirty="0" smtClean="0"/>
+              <a:t>FitNesse Setup (3/3)</a:t>
+            </a:r>
+            <a:r>
+              <a:rPr lang="nl-BE" sz="3600" dirty="0" smtClean="0"/>
+              <a:t/>
+            </a:r>
+            <a:br>
+              <a:rPr lang="nl-BE" sz="3600" dirty="0" smtClean="0"/>
+            </a:br>
+            <a:r>
+              <a:rPr lang="nl-BE" sz="3600" dirty="0" smtClean="0">
+                <a:solidFill>
+                  <a:schemeClr val="bg2">
+                    <a:lumMod val="50000"/>
+                  </a:schemeClr>
+                </a:solidFill>
+              </a:rPr>
+              <a:t>Custmize Root page</a:t>
+            </a:r>
+            <a:endParaRPr lang="nl-BE" sz="3600" dirty="0"/>
+          </a:p>
+        </p:txBody>
+      </p:sp>
+      <p:pic>
+        <p:nvPicPr>
+          <p:cNvPr id="5" name="Picture 2"/>
+          <p:cNvPicPr>
+            <a:picLocks noChangeAspect="1" noChangeArrowheads="1"/>
+          </p:cNvPicPr>
+          <p:nvPr/>
+        </p:nvPicPr>
+        <p:blipFill>
+          <a:blip r:embed="rId4" cstate="print"/>
+          <a:srcRect/>
+          <a:stretch>
+            <a:fillRect/>
+          </a:stretch>
+        </p:blipFill>
+        <p:spPr bwMode="auto">
+          <a:xfrm>
+            <a:off x="7643834" y="241436"/>
+            <a:ext cx="1237258" cy="1258738"/>
+          </a:xfrm>
+          <a:prstGeom prst="rect">
+            <a:avLst/>
+          </a:prstGeom>
+          <a:noFill/>
+          <a:ln w="9525">
+            <a:noFill/>
+            <a:miter lim="800000"/>
+            <a:headEnd/>
+            <a:tailEnd/>
+          </a:ln>
+          <a:effectLst/>
+        </p:spPr>
+      </p:pic>
+      <p:pic>
+        <p:nvPicPr>
+          <p:cNvPr id="6" name="Picture 2"/>
+          <p:cNvPicPr>
+            <a:picLocks noChangeAspect="1" noChangeArrowheads="1"/>
+          </p:cNvPicPr>
+          <p:nvPr/>
+        </p:nvPicPr>
+        <p:blipFill>
+          <a:blip r:embed="rId4" cstate="print"/>
+          <a:srcRect/>
+          <a:stretch>
+            <a:fillRect/>
+          </a:stretch>
+        </p:blipFill>
+        <p:spPr bwMode="auto">
+          <a:xfrm>
+            <a:off x="500034" y="241436"/>
+            <a:ext cx="1237258" cy="1258738"/>
+          </a:xfrm>
+          <a:prstGeom prst="rect">
+            <a:avLst/>
+          </a:prstGeom>
+          <a:noFill/>
+          <a:ln w="9525">
+            <a:noFill/>
+            <a:miter lim="800000"/>
+            <a:headEnd/>
+            <a:tailEnd/>
+          </a:ln>
+          <a:effectLst/>
+        </p:spPr>
+      </p:pic>
+    </p:spTree>
+  </p:cSld>
+  <p:clrMapOvr>
+    <a:masterClrMapping/>
+  </p:clrMapOvr>
+  <p:timing>
+    <p:tnLst>
+      <p:par>
+        <p:cTn id="1" dur="indefinite" restart="never" nodeType="tmRoot"/>
+      </p:par>
+    </p:tnLst>
+  </p:timing>
+</p:sld>
+</file>
+
+<file path=ppt/slides/slide18.xml><?xml version="1.0" encoding="utf-8"?>
 <p:sld xmlns:a="http://schemas.openxmlformats.org/drawingml/2006/main" xmlns:r="http://schemas.openxmlformats.org/officeDocument/2006/relationships" xmlns:p="http://schemas.openxmlformats.org/presentationml/2006/main">
   <p:cSld>
     <p:spTree>
@@ -8887,7 +10563,7 @@
 </p:sld>
 </file>
 
-<file path=ppt/slides/slide16.xml><?xml version="1.0" encoding="utf-8"?>
+<file path=ppt/slides/slide19.xml><?xml version="1.0" encoding="utf-8"?>
 <p:sld xmlns:a="http://schemas.openxmlformats.org/drawingml/2006/main" xmlns:r="http://schemas.openxmlformats.org/officeDocument/2006/relationships" xmlns:p="http://schemas.openxmlformats.org/presentationml/2006/main">
   <p:cSld>
     <p:spTree>
@@ -10228,7 +11904,771 @@
 </p:sld>
 </file>
 
-<file path=ppt/slides/slide17.xml><?xml version="1.0" encoding="utf-8"?>
+<file path=ppt/slides/slide2.xml><?xml version="1.0" encoding="utf-8"?>
+<p:sld xmlns:a="http://schemas.openxmlformats.org/drawingml/2006/main" xmlns:r="http://schemas.openxmlformats.org/officeDocument/2006/relationships" xmlns:p="http://schemas.openxmlformats.org/presentationml/2006/main">
+  <p:cSld>
+    <p:spTree>
+      <p:nvGrpSpPr>
+        <p:cNvPr id="1" name=""/>
+        <p:cNvGrpSpPr/>
+        <p:nvPr/>
+      </p:nvGrpSpPr>
+      <p:grpSpPr>
+        <a:xfrm>
+          <a:off x="0" y="0"/>
+          <a:ext cx="0" cy="0"/>
+          <a:chOff x="0" y="0"/>
+          <a:chExt cx="0" cy="0"/>
+        </a:xfrm>
+      </p:grpSpPr>
+      <p:sp>
+        <p:nvSpPr>
+          <p:cNvPr id="3" name="Content Placeholder 2"/>
+          <p:cNvSpPr>
+            <a:spLocks noGrp="1"/>
+          </p:cNvSpPr>
+          <p:nvPr>
+            <p:ph idx="1"/>
+          </p:nvPr>
+        </p:nvSpPr>
+        <p:spPr/>
+        <p:txBody>
+          <a:bodyPr>
+            <a:normAutofit fontScale="92500" lnSpcReduction="10000"/>
+          </a:bodyPr>
+          <a:lstStyle/>
+          <a:p>
+            <a:r>
+              <a:rPr lang="nl-BE" dirty="0" smtClean="0"/>
+              <a:t>Michel Grootjans</a:t>
+            </a:r>
+          </a:p>
+          <a:p>
+            <a:pPr lvl="1"/>
+            <a:r>
+              <a:rPr lang="nl-BE" dirty="0" smtClean="0"/>
+              <a:t>Enterprise Architect </a:t>
+            </a:r>
+          </a:p>
+          <a:p>
+            <a:pPr lvl="1"/>
+            <a:r>
+              <a:rPr lang="nl-BE" sz="1600" dirty="0" smtClean="0">
+                <a:hlinkClick r:id="rId2"/>
+              </a:rPr>
+              <a:t>             http://www.linkedin.com/in/michelgrootjans</a:t>
+            </a:r>
+            <a:endParaRPr lang="nl-BE" sz="1600" dirty="0" smtClean="0"/>
+          </a:p>
+          <a:p>
+            <a:pPr lvl="1"/>
+            <a:r>
+              <a:rPr lang="nl-BE" sz="1600" dirty="0" smtClean="0">
+                <a:hlinkClick r:id="rId3"/>
+              </a:rPr>
+              <a:t>michel.grootjans@ilean.be</a:t>
+            </a:r>
+            <a:r>
+              <a:rPr lang="nl-BE" sz="1600" dirty="0" smtClean="0"/>
+              <a:t>	 </a:t>
+            </a:r>
+          </a:p>
+          <a:p>
+            <a:pPr lvl="1"/>
+            <a:endParaRPr lang="nl-BE" dirty="0" smtClean="0"/>
+          </a:p>
+          <a:p>
+            <a:r>
+              <a:rPr lang="nl-BE" dirty="0" smtClean="0"/>
+              <a:t>Pascal Mestdach</a:t>
+            </a:r>
+          </a:p>
+          <a:p>
+            <a:pPr lvl="1"/>
+            <a:r>
+              <a:rPr lang="nl-BE" dirty="0" smtClean="0"/>
+              <a:t>Solution Architect</a:t>
+            </a:r>
+          </a:p>
+          <a:p>
+            <a:pPr lvl="1"/>
+            <a:r>
+              <a:rPr lang="nl-BE" sz="1600" dirty="0" smtClean="0">
+                <a:hlinkClick r:id="rId4"/>
+              </a:rPr>
+              <a:t>             http://www.linkedin.com/in/pascalmestdach</a:t>
+            </a:r>
+            <a:r>
+              <a:rPr lang="nl-BE" sz="1600" dirty="0" smtClean="0"/>
+              <a:t> </a:t>
+            </a:r>
+          </a:p>
+          <a:p>
+            <a:pPr lvl="1"/>
+            <a:r>
+              <a:rPr lang="nl-BE" sz="1600" dirty="0" smtClean="0">
+                <a:hlinkClick r:id="rId5"/>
+              </a:rPr>
+              <a:t>pascal.mestdach@infohos.be</a:t>
+            </a:r>
+          </a:p>
+          <a:p>
+            <a:pPr lvl="1">
+              <a:buNone/>
+            </a:pPr>
+            <a:endParaRPr lang="nl-BE" sz="1600" dirty="0" smtClean="0"/>
+          </a:p>
+          <a:p>
+            <a:r>
+              <a:rPr lang="nl-BE" dirty="0" smtClean="0"/>
+              <a:t>Download material:</a:t>
+            </a:r>
+          </a:p>
+          <a:p>
+            <a:pPr lvl="1"/>
+            <a:r>
+              <a:rPr lang="nl-BE" sz="1700" dirty="0" smtClean="0"/>
+              <a:t>On google code: </a:t>
+            </a:r>
+          </a:p>
+          <a:p>
+            <a:pPr lvl="2"/>
+            <a:r>
+              <a:rPr lang="nl-BE" sz="1500" dirty="0" smtClean="0">
+                <a:hlinkClick r:id="rId6"/>
+              </a:rPr>
+              <a:t>http://code.google.com/p/agileacceptancetesting/</a:t>
+            </a:r>
+            <a:r>
+              <a:rPr lang="nl-BE" sz="1500" dirty="0" smtClean="0"/>
+              <a:t> </a:t>
+            </a:r>
+          </a:p>
+          <a:p>
+            <a:pPr lvl="1"/>
+            <a:r>
+              <a:rPr lang="nl-BE" sz="1600" dirty="0" smtClean="0"/>
+              <a:t>Checkout in svn: </a:t>
+            </a:r>
+          </a:p>
+          <a:p>
+            <a:pPr lvl="2"/>
+            <a:r>
+              <a:rPr lang="nl-BE" sz="1400" dirty="0" smtClean="0">
+                <a:hlinkClick r:id="rId7"/>
+              </a:rPr>
+              <a:t>https://agileacceptancetesting.googlecode.com/svn/trunk</a:t>
+            </a:r>
+            <a:r>
+              <a:rPr lang="nl-BE" sz="1400" dirty="0" smtClean="0"/>
+              <a:t> </a:t>
+            </a:r>
+          </a:p>
+        </p:txBody>
+      </p:sp>
+      <p:sp>
+        <p:nvSpPr>
+          <p:cNvPr id="2" name="Title 1"/>
+          <p:cNvSpPr>
+            <a:spLocks noGrp="1"/>
+          </p:cNvSpPr>
+          <p:nvPr>
+            <p:ph type="title"/>
+          </p:nvPr>
+        </p:nvSpPr>
+        <p:spPr/>
+        <p:txBody>
+          <a:bodyPr/>
+          <a:lstStyle/>
+          <a:p>
+            <a:r>
+              <a:rPr lang="nl-BE" dirty="0" smtClean="0"/>
+              <a:t>Biography Presenters</a:t>
+            </a:r>
+            <a:endParaRPr lang="nl-BE" dirty="0"/>
+          </a:p>
+        </p:txBody>
+      </p:sp>
+      <p:pic>
+        <p:nvPicPr>
+          <p:cNvPr id="5" name="Picture 4" descr="iLean.jpg"/>
+          <p:cNvPicPr>
+            <a:picLocks noChangeAspect="1"/>
+          </p:cNvPicPr>
+          <p:nvPr/>
+        </p:nvPicPr>
+        <p:blipFill>
+          <a:blip r:embed="rId8" cstate="print"/>
+          <a:stretch>
+            <a:fillRect/>
+          </a:stretch>
+        </p:blipFill>
+        <p:spPr>
+          <a:xfrm>
+            <a:off x="5143504" y="1428736"/>
+            <a:ext cx="1028700" cy="704850"/>
+          </a:xfrm>
+          <a:prstGeom prst="rect">
+            <a:avLst/>
+          </a:prstGeom>
+        </p:spPr>
+      </p:pic>
+      <p:pic>
+        <p:nvPicPr>
+          <p:cNvPr id="6" name="Picture 5" descr="Ihc.png"/>
+          <p:cNvPicPr>
+            <a:picLocks noChangeAspect="1"/>
+          </p:cNvPicPr>
+          <p:nvPr/>
+        </p:nvPicPr>
+        <p:blipFill>
+          <a:blip r:embed="rId9" cstate="print"/>
+          <a:stretch>
+            <a:fillRect/>
+          </a:stretch>
+        </p:blipFill>
+        <p:spPr>
+          <a:xfrm>
+            <a:off x="5129217" y="3000372"/>
+            <a:ext cx="942981" cy="642942"/>
+          </a:xfrm>
+          <a:prstGeom prst="rect">
+            <a:avLst/>
+          </a:prstGeom>
+        </p:spPr>
+      </p:pic>
+      <p:pic>
+        <p:nvPicPr>
+          <p:cNvPr id="7" name="Picture 6" descr="linkedIn.png"/>
+          <p:cNvPicPr>
+            <a:picLocks noChangeAspect="1"/>
+          </p:cNvPicPr>
+          <p:nvPr/>
+        </p:nvPicPr>
+        <p:blipFill>
+          <a:blip r:embed="rId10" cstate="print"/>
+          <a:stretch>
+            <a:fillRect/>
+          </a:stretch>
+        </p:blipFill>
+        <p:spPr>
+          <a:xfrm>
+            <a:off x="1187366" y="2214554"/>
+            <a:ext cx="785818" cy="211312"/>
+          </a:xfrm>
+          <a:prstGeom prst="rect">
+            <a:avLst/>
+          </a:prstGeom>
+        </p:spPr>
+      </p:pic>
+      <p:pic>
+        <p:nvPicPr>
+          <p:cNvPr id="8" name="Picture 7" descr="linkedIn.png"/>
+          <p:cNvPicPr>
+            <a:picLocks noChangeAspect="1"/>
+          </p:cNvPicPr>
+          <p:nvPr/>
+        </p:nvPicPr>
+        <p:blipFill>
+          <a:blip r:embed="rId10" cstate="print"/>
+          <a:stretch>
+            <a:fillRect/>
+          </a:stretch>
+        </p:blipFill>
+        <p:spPr>
+          <a:xfrm>
+            <a:off x="1178902" y="3750264"/>
+            <a:ext cx="785818" cy="211312"/>
+          </a:xfrm>
+          <a:prstGeom prst="rect">
+            <a:avLst/>
+          </a:prstGeom>
+        </p:spPr>
+      </p:pic>
+    </p:spTree>
+  </p:cSld>
+  <p:clrMapOvr>
+    <a:masterClrMapping/>
+  </p:clrMapOvr>
+  <p:timing>
+    <p:tnLst>
+      <p:par>
+        <p:cTn id="1" dur="indefinite" restart="never" nodeType="tmRoot">
+          <p:childTnLst>
+            <p:seq concurrent="1" nextAc="seek">
+              <p:cTn id="2" dur="indefinite" nodeType="mainSeq">
+                <p:childTnLst>
+                  <p:par>
+                    <p:cTn id="3" fill="hold">
+                      <p:stCondLst>
+                        <p:cond delay="indefinite"/>
+                        <p:cond evt="onBegin" delay="0">
+                          <p:tn val="2"/>
+                        </p:cond>
+                      </p:stCondLst>
+                      <p:childTnLst>
+                        <p:par>
+                          <p:cTn id="4" fill="hold">
+                            <p:stCondLst>
+                              <p:cond delay="0"/>
+                            </p:stCondLst>
+                            <p:childTnLst>
+                              <p:par>
+                                <p:cTn id="5" presetID="1" presetClass="entr" presetSubtype="0" fill="hold" grpId="0" nodeType="withEffect">
+                                  <p:stCondLst>
+                                    <p:cond delay="0"/>
+                                  </p:stCondLst>
+                                  <p:childTnLst>
+                                    <p:set>
+                                      <p:cBhvr>
+                                        <p:cTn id="6" dur="1" fill="hold">
+                                          <p:stCondLst>
+                                            <p:cond delay="0"/>
+                                          </p:stCondLst>
+                                        </p:cTn>
+                                        <p:tgtEl>
+                                          <p:spTgt spid="3">
+                                            <p:txEl>
+                                              <p:pRg st="0" end="0"/>
+                                            </p:txEl>
+                                          </p:spTgt>
+                                        </p:tgtEl>
+                                        <p:attrNameLst>
+                                          <p:attrName>style.visibility</p:attrName>
+                                        </p:attrNameLst>
+                                      </p:cBhvr>
+                                      <p:to>
+                                        <p:strVal val="visible"/>
+                                      </p:to>
+                                    </p:set>
+                                  </p:childTnLst>
+                                </p:cTn>
+                              </p:par>
+                              <p:par>
+                                <p:cTn id="7" presetID="1" presetClass="entr" presetSubtype="0" fill="hold" grpId="0" nodeType="withEffect">
+                                  <p:stCondLst>
+                                    <p:cond delay="0"/>
+                                  </p:stCondLst>
+                                  <p:childTnLst>
+                                    <p:set>
+                                      <p:cBhvr>
+                                        <p:cTn id="8" dur="1" fill="hold">
+                                          <p:stCondLst>
+                                            <p:cond delay="0"/>
+                                          </p:stCondLst>
+                                        </p:cTn>
+                                        <p:tgtEl>
+                                          <p:spTgt spid="3">
+                                            <p:txEl>
+                                              <p:pRg st="1" end="1"/>
+                                            </p:txEl>
+                                          </p:spTgt>
+                                        </p:tgtEl>
+                                        <p:attrNameLst>
+                                          <p:attrName>style.visibility</p:attrName>
+                                        </p:attrNameLst>
+                                      </p:cBhvr>
+                                      <p:to>
+                                        <p:strVal val="visible"/>
+                                      </p:to>
+                                    </p:set>
+                                  </p:childTnLst>
+                                </p:cTn>
+                              </p:par>
+                              <p:par>
+                                <p:cTn id="9" presetID="1" presetClass="entr" presetSubtype="0" fill="hold" grpId="0" nodeType="withEffect">
+                                  <p:stCondLst>
+                                    <p:cond delay="0"/>
+                                  </p:stCondLst>
+                                  <p:childTnLst>
+                                    <p:set>
+                                      <p:cBhvr>
+                                        <p:cTn id="10" dur="1" fill="hold">
+                                          <p:stCondLst>
+                                            <p:cond delay="0"/>
+                                          </p:stCondLst>
+                                        </p:cTn>
+                                        <p:tgtEl>
+                                          <p:spTgt spid="3">
+                                            <p:txEl>
+                                              <p:pRg st="2" end="2"/>
+                                            </p:txEl>
+                                          </p:spTgt>
+                                        </p:tgtEl>
+                                        <p:attrNameLst>
+                                          <p:attrName>style.visibility</p:attrName>
+                                        </p:attrNameLst>
+                                      </p:cBhvr>
+                                      <p:to>
+                                        <p:strVal val="visible"/>
+                                      </p:to>
+                                    </p:set>
+                                  </p:childTnLst>
+                                </p:cTn>
+                              </p:par>
+                              <p:par>
+                                <p:cTn id="11" presetID="1" presetClass="entr" presetSubtype="0" fill="hold" grpId="0" nodeType="withEffect">
+                                  <p:stCondLst>
+                                    <p:cond delay="0"/>
+                                  </p:stCondLst>
+                                  <p:childTnLst>
+                                    <p:set>
+                                      <p:cBhvr>
+                                        <p:cTn id="12" dur="1" fill="hold">
+                                          <p:stCondLst>
+                                            <p:cond delay="0"/>
+                                          </p:stCondLst>
+                                        </p:cTn>
+                                        <p:tgtEl>
+                                          <p:spTgt spid="3">
+                                            <p:txEl>
+                                              <p:pRg st="3" end="3"/>
+                                            </p:txEl>
+                                          </p:spTgt>
+                                        </p:tgtEl>
+                                        <p:attrNameLst>
+                                          <p:attrName>style.visibility</p:attrName>
+                                        </p:attrNameLst>
+                                      </p:cBhvr>
+                                      <p:to>
+                                        <p:strVal val="visible"/>
+                                      </p:to>
+                                    </p:set>
+                                  </p:childTnLst>
+                                </p:cTn>
+                              </p:par>
+                              <p:par>
+                                <p:cTn id="13" presetID="1" presetClass="entr" presetSubtype="0" fill="hold" grpId="0" nodeType="withEffect">
+                                  <p:stCondLst>
+                                    <p:cond delay="0"/>
+                                  </p:stCondLst>
+                                  <p:childTnLst>
+                                    <p:set>
+                                      <p:cBhvr>
+                                        <p:cTn id="14" dur="1" fill="hold">
+                                          <p:stCondLst>
+                                            <p:cond delay="0"/>
+                                          </p:stCondLst>
+                                        </p:cTn>
+                                        <p:tgtEl>
+                                          <p:spTgt spid="3">
+                                            <p:txEl>
+                                              <p:pRg st="5" end="5"/>
+                                            </p:txEl>
+                                          </p:spTgt>
+                                        </p:tgtEl>
+                                        <p:attrNameLst>
+                                          <p:attrName>style.visibility</p:attrName>
+                                        </p:attrNameLst>
+                                      </p:cBhvr>
+                                      <p:to>
+                                        <p:strVal val="visible"/>
+                                      </p:to>
+                                    </p:set>
+                                  </p:childTnLst>
+                                </p:cTn>
+                              </p:par>
+                              <p:par>
+                                <p:cTn id="15" presetID="1" presetClass="entr" presetSubtype="0" fill="hold" grpId="0" nodeType="withEffect">
+                                  <p:stCondLst>
+                                    <p:cond delay="0"/>
+                                  </p:stCondLst>
+                                  <p:childTnLst>
+                                    <p:set>
+                                      <p:cBhvr>
+                                        <p:cTn id="16" dur="1" fill="hold">
+                                          <p:stCondLst>
+                                            <p:cond delay="0"/>
+                                          </p:stCondLst>
+                                        </p:cTn>
+                                        <p:tgtEl>
+                                          <p:spTgt spid="3">
+                                            <p:txEl>
+                                              <p:pRg st="6" end="6"/>
+                                            </p:txEl>
+                                          </p:spTgt>
+                                        </p:tgtEl>
+                                        <p:attrNameLst>
+                                          <p:attrName>style.visibility</p:attrName>
+                                        </p:attrNameLst>
+                                      </p:cBhvr>
+                                      <p:to>
+                                        <p:strVal val="visible"/>
+                                      </p:to>
+                                    </p:set>
+                                  </p:childTnLst>
+                                </p:cTn>
+                              </p:par>
+                              <p:par>
+                                <p:cTn id="17" presetID="1" presetClass="entr" presetSubtype="0" fill="hold" grpId="0" nodeType="withEffect">
+                                  <p:stCondLst>
+                                    <p:cond delay="0"/>
+                                  </p:stCondLst>
+                                  <p:childTnLst>
+                                    <p:set>
+                                      <p:cBhvr>
+                                        <p:cTn id="18" dur="1" fill="hold">
+                                          <p:stCondLst>
+                                            <p:cond delay="0"/>
+                                          </p:stCondLst>
+                                        </p:cTn>
+                                        <p:tgtEl>
+                                          <p:spTgt spid="3">
+                                            <p:txEl>
+                                              <p:pRg st="7" end="7"/>
+                                            </p:txEl>
+                                          </p:spTgt>
+                                        </p:tgtEl>
+                                        <p:attrNameLst>
+                                          <p:attrName>style.visibility</p:attrName>
+                                        </p:attrNameLst>
+                                      </p:cBhvr>
+                                      <p:to>
+                                        <p:strVal val="visible"/>
+                                      </p:to>
+                                    </p:set>
+                                  </p:childTnLst>
+                                </p:cTn>
+                              </p:par>
+                              <p:par>
+                                <p:cTn id="19" presetID="1" presetClass="entr" presetSubtype="0" fill="hold" grpId="0" nodeType="withEffect">
+                                  <p:stCondLst>
+                                    <p:cond delay="0"/>
+                                  </p:stCondLst>
+                                  <p:childTnLst>
+                                    <p:set>
+                                      <p:cBhvr>
+                                        <p:cTn id="20" dur="1" fill="hold">
+                                          <p:stCondLst>
+                                            <p:cond delay="0"/>
+                                          </p:stCondLst>
+                                        </p:cTn>
+                                        <p:tgtEl>
+                                          <p:spTgt spid="3">
+                                            <p:txEl>
+                                              <p:pRg st="8" end="8"/>
+                                            </p:txEl>
+                                          </p:spTgt>
+                                        </p:tgtEl>
+                                        <p:attrNameLst>
+                                          <p:attrName>style.visibility</p:attrName>
+                                        </p:attrNameLst>
+                                      </p:cBhvr>
+                                      <p:to>
+                                        <p:strVal val="visible"/>
+                                      </p:to>
+                                    </p:set>
+                                  </p:childTnLst>
+                                </p:cTn>
+                              </p:par>
+                            </p:childTnLst>
+                          </p:cTn>
+                        </p:par>
+                      </p:childTnLst>
+                    </p:cTn>
+                  </p:par>
+                  <p:par>
+                    <p:cTn id="21" fill="hold">
+                      <p:stCondLst>
+                        <p:cond delay="indefinite"/>
+                      </p:stCondLst>
+                      <p:childTnLst>
+                        <p:par>
+                          <p:cTn id="22" fill="hold">
+                            <p:stCondLst>
+                              <p:cond delay="0"/>
+                            </p:stCondLst>
+                            <p:childTnLst>
+                              <p:par>
+                                <p:cTn id="23" presetID="1" presetClass="entr" presetSubtype="0" fill="hold" grpId="0" nodeType="clickEffect">
+                                  <p:stCondLst>
+                                    <p:cond delay="0"/>
+                                  </p:stCondLst>
+                                  <p:childTnLst>
+                                    <p:set>
+                                      <p:cBhvr>
+                                        <p:cTn id="24" dur="1" fill="hold">
+                                          <p:stCondLst>
+                                            <p:cond delay="0"/>
+                                          </p:stCondLst>
+                                        </p:cTn>
+                                        <p:tgtEl>
+                                          <p:spTgt spid="3">
+                                            <p:txEl>
+                                              <p:pRg st="10" end="10"/>
+                                            </p:txEl>
+                                          </p:spTgt>
+                                        </p:tgtEl>
+                                        <p:attrNameLst>
+                                          <p:attrName>style.visibility</p:attrName>
+                                        </p:attrNameLst>
+                                      </p:cBhvr>
+                                      <p:to>
+                                        <p:strVal val="visible"/>
+                                      </p:to>
+                                    </p:set>
+                                  </p:childTnLst>
+                                </p:cTn>
+                              </p:par>
+                              <p:par>
+                                <p:cTn id="25" presetID="1" presetClass="entr" presetSubtype="0" fill="hold" grpId="0" nodeType="withEffect">
+                                  <p:stCondLst>
+                                    <p:cond delay="0"/>
+                                  </p:stCondLst>
+                                  <p:childTnLst>
+                                    <p:set>
+                                      <p:cBhvr>
+                                        <p:cTn id="26" dur="1" fill="hold">
+                                          <p:stCondLst>
+                                            <p:cond delay="0"/>
+                                          </p:stCondLst>
+                                        </p:cTn>
+                                        <p:tgtEl>
+                                          <p:spTgt spid="3">
+                                            <p:txEl>
+                                              <p:pRg st="11" end="11"/>
+                                            </p:txEl>
+                                          </p:spTgt>
+                                        </p:tgtEl>
+                                        <p:attrNameLst>
+                                          <p:attrName>style.visibility</p:attrName>
+                                        </p:attrNameLst>
+                                      </p:cBhvr>
+                                      <p:to>
+                                        <p:strVal val="visible"/>
+                                      </p:to>
+                                    </p:set>
+                                  </p:childTnLst>
+                                </p:cTn>
+                              </p:par>
+                              <p:par>
+                                <p:cTn id="27" presetID="1" presetClass="entr" presetSubtype="0" fill="hold" grpId="0" nodeType="withEffect">
+                                  <p:stCondLst>
+                                    <p:cond delay="0"/>
+                                  </p:stCondLst>
+                                  <p:childTnLst>
+                                    <p:set>
+                                      <p:cBhvr>
+                                        <p:cTn id="28" dur="1" fill="hold">
+                                          <p:stCondLst>
+                                            <p:cond delay="0"/>
+                                          </p:stCondLst>
+                                        </p:cTn>
+                                        <p:tgtEl>
+                                          <p:spTgt spid="3">
+                                            <p:txEl>
+                                              <p:pRg st="12" end="12"/>
+                                            </p:txEl>
+                                          </p:spTgt>
+                                        </p:tgtEl>
+                                        <p:attrNameLst>
+                                          <p:attrName>style.visibility</p:attrName>
+                                        </p:attrNameLst>
+                                      </p:cBhvr>
+                                      <p:to>
+                                        <p:strVal val="visible"/>
+                                      </p:to>
+                                    </p:set>
+                                  </p:childTnLst>
+                                </p:cTn>
+                              </p:par>
+                              <p:par>
+                                <p:cTn id="29" presetID="1" presetClass="entr" presetSubtype="0" fill="hold" grpId="0" nodeType="withEffect">
+                                  <p:stCondLst>
+                                    <p:cond delay="0"/>
+                                  </p:stCondLst>
+                                  <p:childTnLst>
+                                    <p:set>
+                                      <p:cBhvr>
+                                        <p:cTn id="30" dur="1" fill="hold">
+                                          <p:stCondLst>
+                                            <p:cond delay="0"/>
+                                          </p:stCondLst>
+                                        </p:cTn>
+                                        <p:tgtEl>
+                                          <p:spTgt spid="3">
+                                            <p:txEl>
+                                              <p:pRg st="13" end="13"/>
+                                            </p:txEl>
+                                          </p:spTgt>
+                                        </p:tgtEl>
+                                        <p:attrNameLst>
+                                          <p:attrName>style.visibility</p:attrName>
+                                        </p:attrNameLst>
+                                      </p:cBhvr>
+                                      <p:to>
+                                        <p:strVal val="visible"/>
+                                      </p:to>
+                                    </p:set>
+                                  </p:childTnLst>
+                                </p:cTn>
+                              </p:par>
+                              <p:par>
+                                <p:cTn id="31" presetID="1" presetClass="entr" presetSubtype="0" fill="hold" grpId="0" nodeType="withEffect">
+                                  <p:stCondLst>
+                                    <p:cond delay="0"/>
+                                  </p:stCondLst>
+                                  <p:childTnLst>
+                                    <p:set>
+                                      <p:cBhvr>
+                                        <p:cTn id="32" dur="1" fill="hold">
+                                          <p:stCondLst>
+                                            <p:cond delay="0"/>
+                                          </p:stCondLst>
+                                        </p:cTn>
+                                        <p:tgtEl>
+                                          <p:spTgt spid="3">
+                                            <p:txEl>
+                                              <p:pRg st="14" end="14"/>
+                                            </p:txEl>
+                                          </p:spTgt>
+                                        </p:tgtEl>
+                                        <p:attrNameLst>
+                                          <p:attrName>style.visibility</p:attrName>
+                                        </p:attrNameLst>
+                                      </p:cBhvr>
+                                      <p:to>
+                                        <p:strVal val="visible"/>
+                                      </p:to>
+                                    </p:set>
+                                  </p:childTnLst>
+                                </p:cTn>
+                              </p:par>
+                            </p:childTnLst>
+                          </p:cTn>
+                        </p:par>
+                      </p:childTnLst>
+                    </p:cTn>
+                  </p:par>
+                </p:childTnLst>
+              </p:cTn>
+              <p:prevCondLst>
+                <p:cond evt="onPrev" delay="0">
+                  <p:tgtEl>
+                    <p:sldTgt/>
+                  </p:tgtEl>
+                </p:cond>
+              </p:prevCondLst>
+              <p:nextCondLst>
+                <p:cond evt="onNext" delay="0">
+                  <p:tgtEl>
+                    <p:sldTgt/>
+                  </p:tgtEl>
+                </p:cond>
+              </p:nextCondLst>
+            </p:seq>
+          </p:childTnLst>
+        </p:cTn>
+      </p:par>
+    </p:tnLst>
+    <p:bldLst>
+      <p:bldP spid="3" grpId="0" uiExpand="1" build="p"/>
+    </p:bldLst>
+  </p:timing>
+</p:sld>
+</file>
+
+<file path=ppt/slides/slide20.xml><?xml version="1.0" encoding="utf-8"?>
 <p:sld xmlns:a="http://schemas.openxmlformats.org/drawingml/2006/main" xmlns:r="http://schemas.openxmlformats.org/officeDocument/2006/relationships" xmlns:p="http://schemas.openxmlformats.org/presentationml/2006/main">
   <p:cSld>
     <p:spTree>
@@ -10862,7 +13302,7 @@
 </p:sld>
 </file>
 
-<file path=ppt/slides/slide18.xml><?xml version="1.0" encoding="utf-8"?>
+<file path=ppt/slides/slide21.xml><?xml version="1.0" encoding="utf-8"?>
 <p:sld xmlns:a="http://schemas.openxmlformats.org/drawingml/2006/main" xmlns:r="http://schemas.openxmlformats.org/officeDocument/2006/relationships" xmlns:p="http://schemas.openxmlformats.org/presentationml/2006/main">
   <p:cSld>
     <p:spTree>
@@ -11018,7 +13458,7 @@
 </p:sld>
 </file>
 
-<file path=ppt/slides/slide19.xml><?xml version="1.0" encoding="utf-8"?>
+<file path=ppt/slides/slide22.xml><?xml version="1.0" encoding="utf-8"?>
 <p:sld xmlns:a="http://schemas.openxmlformats.org/drawingml/2006/main" xmlns:r="http://schemas.openxmlformats.org/officeDocument/2006/relationships" xmlns:p="http://schemas.openxmlformats.org/presentationml/2006/main">
   <p:cSld>
     <p:spTree>
@@ -11736,7 +14176,7 @@
 </p:sld>
 </file>
 
-<file path=ppt/slides/slide2.xml><?xml version="1.0" encoding="utf-8"?>
+<file path=ppt/slides/slide23.xml><?xml version="1.0" encoding="utf-8"?>
 <p:sld xmlns:a="http://schemas.openxmlformats.org/drawingml/2006/main" xmlns:r="http://schemas.openxmlformats.org/officeDocument/2006/relationships" xmlns:p="http://schemas.openxmlformats.org/presentationml/2006/main">
   <p:cSld>
     <p:spTree>
@@ -11766,770 +14206,6 @@
         <p:spPr/>
         <p:txBody>
           <a:bodyPr>
-            <a:normAutofit fontScale="92500" lnSpcReduction="10000"/>
-          </a:bodyPr>
-          <a:lstStyle/>
-          <a:p>
-            <a:r>
-              <a:rPr lang="nl-BE" dirty="0" smtClean="0"/>
-              <a:t>Michel Grootjans</a:t>
-            </a:r>
-          </a:p>
-          <a:p>
-            <a:pPr lvl="1"/>
-            <a:r>
-              <a:rPr lang="nl-BE" dirty="0" smtClean="0"/>
-              <a:t>Enterprise Architect </a:t>
-            </a:r>
-          </a:p>
-          <a:p>
-            <a:pPr lvl="1"/>
-            <a:r>
-              <a:rPr lang="nl-BE" sz="1600" dirty="0" smtClean="0">
-                <a:hlinkClick r:id="rId2"/>
-              </a:rPr>
-              <a:t>             http://www.linkedin.com/in/michelgrootjans</a:t>
-            </a:r>
-            <a:endParaRPr lang="nl-BE" sz="1600" dirty="0" smtClean="0"/>
-          </a:p>
-          <a:p>
-            <a:pPr lvl="1"/>
-            <a:r>
-              <a:rPr lang="nl-BE" sz="1600" dirty="0" smtClean="0">
-                <a:hlinkClick r:id="rId3"/>
-              </a:rPr>
-              <a:t>michel.grootjans@ilean.be</a:t>
-            </a:r>
-            <a:r>
-              <a:rPr lang="nl-BE" sz="1600" dirty="0" smtClean="0"/>
-              <a:t>	 </a:t>
-            </a:r>
-          </a:p>
-          <a:p>
-            <a:pPr lvl="1"/>
-            <a:endParaRPr lang="nl-BE" dirty="0" smtClean="0"/>
-          </a:p>
-          <a:p>
-            <a:r>
-              <a:rPr lang="nl-BE" dirty="0" smtClean="0"/>
-              <a:t>Pascal Mestdach</a:t>
-            </a:r>
-          </a:p>
-          <a:p>
-            <a:pPr lvl="1"/>
-            <a:r>
-              <a:rPr lang="nl-BE" dirty="0" smtClean="0"/>
-              <a:t>Solution Architect</a:t>
-            </a:r>
-          </a:p>
-          <a:p>
-            <a:pPr lvl="1"/>
-            <a:r>
-              <a:rPr lang="nl-BE" sz="1600" dirty="0" smtClean="0">
-                <a:hlinkClick r:id="rId4"/>
-              </a:rPr>
-              <a:t>             http://www.linkedin.com/in/pascalmestdach</a:t>
-            </a:r>
-            <a:r>
-              <a:rPr lang="nl-BE" sz="1600" dirty="0" smtClean="0"/>
-              <a:t> </a:t>
-            </a:r>
-          </a:p>
-          <a:p>
-            <a:pPr lvl="1"/>
-            <a:r>
-              <a:rPr lang="nl-BE" sz="1600" dirty="0" smtClean="0">
-                <a:hlinkClick r:id="rId5"/>
-              </a:rPr>
-              <a:t>pascal.mestdach@infohos.be</a:t>
-            </a:r>
-          </a:p>
-          <a:p>
-            <a:pPr lvl="1">
-              <a:buNone/>
-            </a:pPr>
-            <a:endParaRPr lang="nl-BE" sz="1600" dirty="0" smtClean="0"/>
-          </a:p>
-          <a:p>
-            <a:r>
-              <a:rPr lang="nl-BE" dirty="0" smtClean="0"/>
-              <a:t>Download material:</a:t>
-            </a:r>
-          </a:p>
-          <a:p>
-            <a:pPr lvl="1"/>
-            <a:r>
-              <a:rPr lang="nl-BE" sz="1700" dirty="0" smtClean="0"/>
-              <a:t>On google code: </a:t>
-            </a:r>
-          </a:p>
-          <a:p>
-            <a:pPr lvl="2"/>
-            <a:r>
-              <a:rPr lang="nl-BE" sz="1500" dirty="0" smtClean="0">
-                <a:hlinkClick r:id="rId6"/>
-              </a:rPr>
-              <a:t>http://code.google.com/p/agileacceptancetesting/</a:t>
-            </a:r>
-            <a:r>
-              <a:rPr lang="nl-BE" sz="1500" dirty="0" smtClean="0"/>
-              <a:t> </a:t>
-            </a:r>
-          </a:p>
-          <a:p>
-            <a:pPr lvl="1"/>
-            <a:r>
-              <a:rPr lang="nl-BE" sz="1600" dirty="0" smtClean="0"/>
-              <a:t>Checkout in svn: </a:t>
-            </a:r>
-          </a:p>
-          <a:p>
-            <a:pPr lvl="2"/>
-            <a:r>
-              <a:rPr lang="nl-BE" sz="1400" dirty="0" smtClean="0">
-                <a:hlinkClick r:id="rId7"/>
-              </a:rPr>
-              <a:t>https://agileacceptancetesting.googlecode.com/svn/trunk</a:t>
-            </a:r>
-            <a:r>
-              <a:rPr lang="nl-BE" sz="1400" dirty="0" smtClean="0"/>
-              <a:t> </a:t>
-            </a:r>
-          </a:p>
-        </p:txBody>
-      </p:sp>
-      <p:sp>
-        <p:nvSpPr>
-          <p:cNvPr id="2" name="Title 1"/>
-          <p:cNvSpPr>
-            <a:spLocks noGrp="1"/>
-          </p:cNvSpPr>
-          <p:nvPr>
-            <p:ph type="title"/>
-          </p:nvPr>
-        </p:nvSpPr>
-        <p:spPr/>
-        <p:txBody>
-          <a:bodyPr/>
-          <a:lstStyle/>
-          <a:p>
-            <a:r>
-              <a:rPr lang="nl-BE" dirty="0" smtClean="0"/>
-              <a:t>Biography Presenters</a:t>
-            </a:r>
-            <a:endParaRPr lang="nl-BE" dirty="0"/>
-          </a:p>
-        </p:txBody>
-      </p:sp>
-      <p:pic>
-        <p:nvPicPr>
-          <p:cNvPr id="5" name="Picture 4" descr="iLean.jpg"/>
-          <p:cNvPicPr>
-            <a:picLocks noChangeAspect="1"/>
-          </p:cNvPicPr>
-          <p:nvPr/>
-        </p:nvPicPr>
-        <p:blipFill>
-          <a:blip r:embed="rId8" cstate="print"/>
-          <a:stretch>
-            <a:fillRect/>
-          </a:stretch>
-        </p:blipFill>
-        <p:spPr>
-          <a:xfrm>
-            <a:off x="5143504" y="1428736"/>
-            <a:ext cx="1028700" cy="704850"/>
-          </a:xfrm>
-          <a:prstGeom prst="rect">
-            <a:avLst/>
-          </a:prstGeom>
-        </p:spPr>
-      </p:pic>
-      <p:pic>
-        <p:nvPicPr>
-          <p:cNvPr id="6" name="Picture 5" descr="Ihc.png"/>
-          <p:cNvPicPr>
-            <a:picLocks noChangeAspect="1"/>
-          </p:cNvPicPr>
-          <p:nvPr/>
-        </p:nvPicPr>
-        <p:blipFill>
-          <a:blip r:embed="rId9" cstate="print"/>
-          <a:stretch>
-            <a:fillRect/>
-          </a:stretch>
-        </p:blipFill>
-        <p:spPr>
-          <a:xfrm>
-            <a:off x="5129217" y="3000372"/>
-            <a:ext cx="942981" cy="642942"/>
-          </a:xfrm>
-          <a:prstGeom prst="rect">
-            <a:avLst/>
-          </a:prstGeom>
-        </p:spPr>
-      </p:pic>
-      <p:pic>
-        <p:nvPicPr>
-          <p:cNvPr id="7" name="Picture 6" descr="linkedIn.png"/>
-          <p:cNvPicPr>
-            <a:picLocks noChangeAspect="1"/>
-          </p:cNvPicPr>
-          <p:nvPr/>
-        </p:nvPicPr>
-        <p:blipFill>
-          <a:blip r:embed="rId10" cstate="print"/>
-          <a:stretch>
-            <a:fillRect/>
-          </a:stretch>
-        </p:blipFill>
-        <p:spPr>
-          <a:xfrm>
-            <a:off x="1187366" y="2214554"/>
-            <a:ext cx="785818" cy="211312"/>
-          </a:xfrm>
-          <a:prstGeom prst="rect">
-            <a:avLst/>
-          </a:prstGeom>
-        </p:spPr>
-      </p:pic>
-      <p:pic>
-        <p:nvPicPr>
-          <p:cNvPr id="8" name="Picture 7" descr="linkedIn.png"/>
-          <p:cNvPicPr>
-            <a:picLocks noChangeAspect="1"/>
-          </p:cNvPicPr>
-          <p:nvPr/>
-        </p:nvPicPr>
-        <p:blipFill>
-          <a:blip r:embed="rId10" cstate="print"/>
-          <a:stretch>
-            <a:fillRect/>
-          </a:stretch>
-        </p:blipFill>
-        <p:spPr>
-          <a:xfrm>
-            <a:off x="1178902" y="3750264"/>
-            <a:ext cx="785818" cy="211312"/>
-          </a:xfrm>
-          <a:prstGeom prst="rect">
-            <a:avLst/>
-          </a:prstGeom>
-        </p:spPr>
-      </p:pic>
-    </p:spTree>
-  </p:cSld>
-  <p:clrMapOvr>
-    <a:masterClrMapping/>
-  </p:clrMapOvr>
-  <p:timing>
-    <p:tnLst>
-      <p:par>
-        <p:cTn id="1" dur="indefinite" restart="never" nodeType="tmRoot">
-          <p:childTnLst>
-            <p:seq concurrent="1" nextAc="seek">
-              <p:cTn id="2" dur="indefinite" nodeType="mainSeq">
-                <p:childTnLst>
-                  <p:par>
-                    <p:cTn id="3" fill="hold">
-                      <p:stCondLst>
-                        <p:cond delay="indefinite"/>
-                        <p:cond evt="onBegin" delay="0">
-                          <p:tn val="2"/>
-                        </p:cond>
-                      </p:stCondLst>
-                      <p:childTnLst>
-                        <p:par>
-                          <p:cTn id="4" fill="hold">
-                            <p:stCondLst>
-                              <p:cond delay="0"/>
-                            </p:stCondLst>
-                            <p:childTnLst>
-                              <p:par>
-                                <p:cTn id="5" presetID="1" presetClass="entr" presetSubtype="0" fill="hold" grpId="0" nodeType="withEffect">
-                                  <p:stCondLst>
-                                    <p:cond delay="0"/>
-                                  </p:stCondLst>
-                                  <p:childTnLst>
-                                    <p:set>
-                                      <p:cBhvr>
-                                        <p:cTn id="6" dur="1" fill="hold">
-                                          <p:stCondLst>
-                                            <p:cond delay="0"/>
-                                          </p:stCondLst>
-                                        </p:cTn>
-                                        <p:tgtEl>
-                                          <p:spTgt spid="3">
-                                            <p:txEl>
-                                              <p:pRg st="0" end="0"/>
-                                            </p:txEl>
-                                          </p:spTgt>
-                                        </p:tgtEl>
-                                        <p:attrNameLst>
-                                          <p:attrName>style.visibility</p:attrName>
-                                        </p:attrNameLst>
-                                      </p:cBhvr>
-                                      <p:to>
-                                        <p:strVal val="visible"/>
-                                      </p:to>
-                                    </p:set>
-                                  </p:childTnLst>
-                                </p:cTn>
-                              </p:par>
-                              <p:par>
-                                <p:cTn id="7" presetID="1" presetClass="entr" presetSubtype="0" fill="hold" grpId="0" nodeType="withEffect">
-                                  <p:stCondLst>
-                                    <p:cond delay="0"/>
-                                  </p:stCondLst>
-                                  <p:childTnLst>
-                                    <p:set>
-                                      <p:cBhvr>
-                                        <p:cTn id="8" dur="1" fill="hold">
-                                          <p:stCondLst>
-                                            <p:cond delay="0"/>
-                                          </p:stCondLst>
-                                        </p:cTn>
-                                        <p:tgtEl>
-                                          <p:spTgt spid="3">
-                                            <p:txEl>
-                                              <p:pRg st="1" end="1"/>
-                                            </p:txEl>
-                                          </p:spTgt>
-                                        </p:tgtEl>
-                                        <p:attrNameLst>
-                                          <p:attrName>style.visibility</p:attrName>
-                                        </p:attrNameLst>
-                                      </p:cBhvr>
-                                      <p:to>
-                                        <p:strVal val="visible"/>
-                                      </p:to>
-                                    </p:set>
-                                  </p:childTnLst>
-                                </p:cTn>
-                              </p:par>
-                              <p:par>
-                                <p:cTn id="9" presetID="1" presetClass="entr" presetSubtype="0" fill="hold" grpId="0" nodeType="withEffect">
-                                  <p:stCondLst>
-                                    <p:cond delay="0"/>
-                                  </p:stCondLst>
-                                  <p:childTnLst>
-                                    <p:set>
-                                      <p:cBhvr>
-                                        <p:cTn id="10" dur="1" fill="hold">
-                                          <p:stCondLst>
-                                            <p:cond delay="0"/>
-                                          </p:stCondLst>
-                                        </p:cTn>
-                                        <p:tgtEl>
-                                          <p:spTgt spid="3">
-                                            <p:txEl>
-                                              <p:pRg st="2" end="2"/>
-                                            </p:txEl>
-                                          </p:spTgt>
-                                        </p:tgtEl>
-                                        <p:attrNameLst>
-                                          <p:attrName>style.visibility</p:attrName>
-                                        </p:attrNameLst>
-                                      </p:cBhvr>
-                                      <p:to>
-                                        <p:strVal val="visible"/>
-                                      </p:to>
-                                    </p:set>
-                                  </p:childTnLst>
-                                </p:cTn>
-                              </p:par>
-                              <p:par>
-                                <p:cTn id="11" presetID="1" presetClass="entr" presetSubtype="0" fill="hold" grpId="0" nodeType="withEffect">
-                                  <p:stCondLst>
-                                    <p:cond delay="0"/>
-                                  </p:stCondLst>
-                                  <p:childTnLst>
-                                    <p:set>
-                                      <p:cBhvr>
-                                        <p:cTn id="12" dur="1" fill="hold">
-                                          <p:stCondLst>
-                                            <p:cond delay="0"/>
-                                          </p:stCondLst>
-                                        </p:cTn>
-                                        <p:tgtEl>
-                                          <p:spTgt spid="3">
-                                            <p:txEl>
-                                              <p:pRg st="3" end="3"/>
-                                            </p:txEl>
-                                          </p:spTgt>
-                                        </p:tgtEl>
-                                        <p:attrNameLst>
-                                          <p:attrName>style.visibility</p:attrName>
-                                        </p:attrNameLst>
-                                      </p:cBhvr>
-                                      <p:to>
-                                        <p:strVal val="visible"/>
-                                      </p:to>
-                                    </p:set>
-                                  </p:childTnLst>
-                                </p:cTn>
-                              </p:par>
-                              <p:par>
-                                <p:cTn id="13" presetID="1" presetClass="entr" presetSubtype="0" fill="hold" grpId="0" nodeType="withEffect">
-                                  <p:stCondLst>
-                                    <p:cond delay="0"/>
-                                  </p:stCondLst>
-                                  <p:childTnLst>
-                                    <p:set>
-                                      <p:cBhvr>
-                                        <p:cTn id="14" dur="1" fill="hold">
-                                          <p:stCondLst>
-                                            <p:cond delay="0"/>
-                                          </p:stCondLst>
-                                        </p:cTn>
-                                        <p:tgtEl>
-                                          <p:spTgt spid="3">
-                                            <p:txEl>
-                                              <p:pRg st="5" end="5"/>
-                                            </p:txEl>
-                                          </p:spTgt>
-                                        </p:tgtEl>
-                                        <p:attrNameLst>
-                                          <p:attrName>style.visibility</p:attrName>
-                                        </p:attrNameLst>
-                                      </p:cBhvr>
-                                      <p:to>
-                                        <p:strVal val="visible"/>
-                                      </p:to>
-                                    </p:set>
-                                  </p:childTnLst>
-                                </p:cTn>
-                              </p:par>
-                              <p:par>
-                                <p:cTn id="15" presetID="1" presetClass="entr" presetSubtype="0" fill="hold" grpId="0" nodeType="withEffect">
-                                  <p:stCondLst>
-                                    <p:cond delay="0"/>
-                                  </p:stCondLst>
-                                  <p:childTnLst>
-                                    <p:set>
-                                      <p:cBhvr>
-                                        <p:cTn id="16" dur="1" fill="hold">
-                                          <p:stCondLst>
-                                            <p:cond delay="0"/>
-                                          </p:stCondLst>
-                                        </p:cTn>
-                                        <p:tgtEl>
-                                          <p:spTgt spid="3">
-                                            <p:txEl>
-                                              <p:pRg st="6" end="6"/>
-                                            </p:txEl>
-                                          </p:spTgt>
-                                        </p:tgtEl>
-                                        <p:attrNameLst>
-                                          <p:attrName>style.visibility</p:attrName>
-                                        </p:attrNameLst>
-                                      </p:cBhvr>
-                                      <p:to>
-                                        <p:strVal val="visible"/>
-                                      </p:to>
-                                    </p:set>
-                                  </p:childTnLst>
-                                </p:cTn>
-                              </p:par>
-                              <p:par>
-                                <p:cTn id="17" presetID="1" presetClass="entr" presetSubtype="0" fill="hold" grpId="0" nodeType="withEffect">
-                                  <p:stCondLst>
-                                    <p:cond delay="0"/>
-                                  </p:stCondLst>
-                                  <p:childTnLst>
-                                    <p:set>
-                                      <p:cBhvr>
-                                        <p:cTn id="18" dur="1" fill="hold">
-                                          <p:stCondLst>
-                                            <p:cond delay="0"/>
-                                          </p:stCondLst>
-                                        </p:cTn>
-                                        <p:tgtEl>
-                                          <p:spTgt spid="3">
-                                            <p:txEl>
-                                              <p:pRg st="7" end="7"/>
-                                            </p:txEl>
-                                          </p:spTgt>
-                                        </p:tgtEl>
-                                        <p:attrNameLst>
-                                          <p:attrName>style.visibility</p:attrName>
-                                        </p:attrNameLst>
-                                      </p:cBhvr>
-                                      <p:to>
-                                        <p:strVal val="visible"/>
-                                      </p:to>
-                                    </p:set>
-                                  </p:childTnLst>
-                                </p:cTn>
-                              </p:par>
-                              <p:par>
-                                <p:cTn id="19" presetID="1" presetClass="entr" presetSubtype="0" fill="hold" grpId="0" nodeType="withEffect">
-                                  <p:stCondLst>
-                                    <p:cond delay="0"/>
-                                  </p:stCondLst>
-                                  <p:childTnLst>
-                                    <p:set>
-                                      <p:cBhvr>
-                                        <p:cTn id="20" dur="1" fill="hold">
-                                          <p:stCondLst>
-                                            <p:cond delay="0"/>
-                                          </p:stCondLst>
-                                        </p:cTn>
-                                        <p:tgtEl>
-                                          <p:spTgt spid="3">
-                                            <p:txEl>
-                                              <p:pRg st="8" end="8"/>
-                                            </p:txEl>
-                                          </p:spTgt>
-                                        </p:tgtEl>
-                                        <p:attrNameLst>
-                                          <p:attrName>style.visibility</p:attrName>
-                                        </p:attrNameLst>
-                                      </p:cBhvr>
-                                      <p:to>
-                                        <p:strVal val="visible"/>
-                                      </p:to>
-                                    </p:set>
-                                  </p:childTnLst>
-                                </p:cTn>
-                              </p:par>
-                            </p:childTnLst>
-                          </p:cTn>
-                        </p:par>
-                      </p:childTnLst>
-                    </p:cTn>
-                  </p:par>
-                  <p:par>
-                    <p:cTn id="21" fill="hold">
-                      <p:stCondLst>
-                        <p:cond delay="indefinite"/>
-                      </p:stCondLst>
-                      <p:childTnLst>
-                        <p:par>
-                          <p:cTn id="22" fill="hold">
-                            <p:stCondLst>
-                              <p:cond delay="0"/>
-                            </p:stCondLst>
-                            <p:childTnLst>
-                              <p:par>
-                                <p:cTn id="23" presetID="1" presetClass="entr" presetSubtype="0" fill="hold" grpId="0" nodeType="clickEffect">
-                                  <p:stCondLst>
-                                    <p:cond delay="0"/>
-                                  </p:stCondLst>
-                                  <p:childTnLst>
-                                    <p:set>
-                                      <p:cBhvr>
-                                        <p:cTn id="24" dur="1" fill="hold">
-                                          <p:stCondLst>
-                                            <p:cond delay="0"/>
-                                          </p:stCondLst>
-                                        </p:cTn>
-                                        <p:tgtEl>
-                                          <p:spTgt spid="3">
-                                            <p:txEl>
-                                              <p:pRg st="10" end="10"/>
-                                            </p:txEl>
-                                          </p:spTgt>
-                                        </p:tgtEl>
-                                        <p:attrNameLst>
-                                          <p:attrName>style.visibility</p:attrName>
-                                        </p:attrNameLst>
-                                      </p:cBhvr>
-                                      <p:to>
-                                        <p:strVal val="visible"/>
-                                      </p:to>
-                                    </p:set>
-                                  </p:childTnLst>
-                                </p:cTn>
-                              </p:par>
-                              <p:par>
-                                <p:cTn id="25" presetID="1" presetClass="entr" presetSubtype="0" fill="hold" grpId="0" nodeType="withEffect">
-                                  <p:stCondLst>
-                                    <p:cond delay="0"/>
-                                  </p:stCondLst>
-                                  <p:childTnLst>
-                                    <p:set>
-                                      <p:cBhvr>
-                                        <p:cTn id="26" dur="1" fill="hold">
-                                          <p:stCondLst>
-                                            <p:cond delay="0"/>
-                                          </p:stCondLst>
-                                        </p:cTn>
-                                        <p:tgtEl>
-                                          <p:spTgt spid="3">
-                                            <p:txEl>
-                                              <p:pRg st="11" end="11"/>
-                                            </p:txEl>
-                                          </p:spTgt>
-                                        </p:tgtEl>
-                                        <p:attrNameLst>
-                                          <p:attrName>style.visibility</p:attrName>
-                                        </p:attrNameLst>
-                                      </p:cBhvr>
-                                      <p:to>
-                                        <p:strVal val="visible"/>
-                                      </p:to>
-                                    </p:set>
-                                  </p:childTnLst>
-                                </p:cTn>
-                              </p:par>
-                              <p:par>
-                                <p:cTn id="27" presetID="1" presetClass="entr" presetSubtype="0" fill="hold" grpId="0" nodeType="withEffect">
-                                  <p:stCondLst>
-                                    <p:cond delay="0"/>
-                                  </p:stCondLst>
-                                  <p:childTnLst>
-                                    <p:set>
-                                      <p:cBhvr>
-                                        <p:cTn id="28" dur="1" fill="hold">
-                                          <p:stCondLst>
-                                            <p:cond delay="0"/>
-                                          </p:stCondLst>
-                                        </p:cTn>
-                                        <p:tgtEl>
-                                          <p:spTgt spid="3">
-                                            <p:txEl>
-                                              <p:pRg st="12" end="12"/>
-                                            </p:txEl>
-                                          </p:spTgt>
-                                        </p:tgtEl>
-                                        <p:attrNameLst>
-                                          <p:attrName>style.visibility</p:attrName>
-                                        </p:attrNameLst>
-                                      </p:cBhvr>
-                                      <p:to>
-                                        <p:strVal val="visible"/>
-                                      </p:to>
-                                    </p:set>
-                                  </p:childTnLst>
-                                </p:cTn>
-                              </p:par>
-                              <p:par>
-                                <p:cTn id="29" presetID="1" presetClass="entr" presetSubtype="0" fill="hold" grpId="0" nodeType="withEffect">
-                                  <p:stCondLst>
-                                    <p:cond delay="0"/>
-                                  </p:stCondLst>
-                                  <p:childTnLst>
-                                    <p:set>
-                                      <p:cBhvr>
-                                        <p:cTn id="30" dur="1" fill="hold">
-                                          <p:stCondLst>
-                                            <p:cond delay="0"/>
-                                          </p:stCondLst>
-                                        </p:cTn>
-                                        <p:tgtEl>
-                                          <p:spTgt spid="3">
-                                            <p:txEl>
-                                              <p:pRg st="13" end="13"/>
-                                            </p:txEl>
-                                          </p:spTgt>
-                                        </p:tgtEl>
-                                        <p:attrNameLst>
-                                          <p:attrName>style.visibility</p:attrName>
-                                        </p:attrNameLst>
-                                      </p:cBhvr>
-                                      <p:to>
-                                        <p:strVal val="visible"/>
-                                      </p:to>
-                                    </p:set>
-                                  </p:childTnLst>
-                                </p:cTn>
-                              </p:par>
-                              <p:par>
-                                <p:cTn id="31" presetID="1" presetClass="entr" presetSubtype="0" fill="hold" grpId="0" nodeType="withEffect">
-                                  <p:stCondLst>
-                                    <p:cond delay="0"/>
-                                  </p:stCondLst>
-                                  <p:childTnLst>
-                                    <p:set>
-                                      <p:cBhvr>
-                                        <p:cTn id="32" dur="1" fill="hold">
-                                          <p:stCondLst>
-                                            <p:cond delay="0"/>
-                                          </p:stCondLst>
-                                        </p:cTn>
-                                        <p:tgtEl>
-                                          <p:spTgt spid="3">
-                                            <p:txEl>
-                                              <p:pRg st="14" end="14"/>
-                                            </p:txEl>
-                                          </p:spTgt>
-                                        </p:tgtEl>
-                                        <p:attrNameLst>
-                                          <p:attrName>style.visibility</p:attrName>
-                                        </p:attrNameLst>
-                                      </p:cBhvr>
-                                      <p:to>
-                                        <p:strVal val="visible"/>
-                                      </p:to>
-                                    </p:set>
-                                  </p:childTnLst>
-                                </p:cTn>
-                              </p:par>
-                            </p:childTnLst>
-                          </p:cTn>
-                        </p:par>
-                      </p:childTnLst>
-                    </p:cTn>
-                  </p:par>
-                </p:childTnLst>
-              </p:cTn>
-              <p:prevCondLst>
-                <p:cond evt="onPrev" delay="0">
-                  <p:tgtEl>
-                    <p:sldTgt/>
-                  </p:tgtEl>
-                </p:cond>
-              </p:prevCondLst>
-              <p:nextCondLst>
-                <p:cond evt="onNext" delay="0">
-                  <p:tgtEl>
-                    <p:sldTgt/>
-                  </p:tgtEl>
-                </p:cond>
-              </p:nextCondLst>
-            </p:seq>
-          </p:childTnLst>
-        </p:cTn>
-      </p:par>
-    </p:tnLst>
-    <p:bldLst>
-      <p:bldP spid="3" grpId="0" uiExpand="1" build="p"/>
-    </p:bldLst>
-  </p:timing>
-</p:sld>
-</file>
-
-<file path=ppt/slides/slide20.xml><?xml version="1.0" encoding="utf-8"?>
-<p:sld xmlns:a="http://schemas.openxmlformats.org/drawingml/2006/main" xmlns:r="http://schemas.openxmlformats.org/officeDocument/2006/relationships" xmlns:p="http://schemas.openxmlformats.org/presentationml/2006/main">
-  <p:cSld>
-    <p:spTree>
-      <p:nvGrpSpPr>
-        <p:cNvPr id="1" name=""/>
-        <p:cNvGrpSpPr/>
-        <p:nvPr/>
-      </p:nvGrpSpPr>
-      <p:grpSpPr>
-        <a:xfrm>
-          <a:off x="0" y="0"/>
-          <a:ext cx="0" cy="0"/>
-          <a:chOff x="0" y="0"/>
-          <a:chExt cx="0" cy="0"/>
-        </a:xfrm>
-      </p:grpSpPr>
-      <p:sp>
-        <p:nvSpPr>
-          <p:cNvPr id="3" name="Content Placeholder 2"/>
-          <p:cNvSpPr>
-            <a:spLocks noGrp="1"/>
-          </p:cNvSpPr>
-          <p:nvPr>
-            <p:ph idx="1"/>
-          </p:nvPr>
-        </p:nvSpPr>
-        <p:spPr/>
-        <p:txBody>
-          <a:bodyPr>
             <a:normAutofit/>
           </a:bodyPr>
           <a:lstStyle/>
@@ -12603,7 +14279,7 @@
 </p:sld>
 </file>
 
-<file path=ppt/slides/slide21.xml><?xml version="1.0" encoding="utf-8"?>
+<file path=ppt/slides/slide24.xml><?xml version="1.0" encoding="utf-8"?>
 <p:sld xmlns:a="http://schemas.openxmlformats.org/drawingml/2006/main" xmlns:r="http://schemas.openxmlformats.org/officeDocument/2006/relationships" xmlns:p="http://schemas.openxmlformats.org/presentationml/2006/main">
   <p:cSld>
     <p:spTree>
@@ -12759,7 +14435,7 @@
 </p:sld>
 </file>
 
-<file path=ppt/slides/slide22.xml><?xml version="1.0" encoding="utf-8"?>
+<file path=ppt/slides/slide25.xml><?xml version="1.0" encoding="utf-8"?>
 <p:sld xmlns:a="http://schemas.openxmlformats.org/drawingml/2006/main" xmlns:r="http://schemas.openxmlformats.org/officeDocument/2006/relationships" xmlns:p="http://schemas.openxmlformats.org/presentationml/2006/main">
   <p:cSld>
     <p:spTree>
@@ -13170,7 +14846,7 @@
 </p:sld>
 </file>
 
-<file path=ppt/slides/slide23.xml><?xml version="1.0" encoding="utf-8"?>
+<file path=ppt/slides/slide26.xml><?xml version="1.0" encoding="utf-8"?>
 <p:sld xmlns:a="http://schemas.openxmlformats.org/drawingml/2006/main" xmlns:r="http://schemas.openxmlformats.org/officeDocument/2006/relationships" xmlns:p="http://schemas.openxmlformats.org/presentationml/2006/main">
   <p:cSld>
     <p:spTree>
@@ -13517,7 +15193,7 @@
 </p:sld>
 </file>
 
-<file path=ppt/slides/slide24.xml><?xml version="1.0" encoding="utf-8"?>
+<file path=ppt/slides/slide27.xml><?xml version="1.0" encoding="utf-8"?>
 <p:sld xmlns:a="http://schemas.openxmlformats.org/drawingml/2006/main" xmlns:r="http://schemas.openxmlformats.org/officeDocument/2006/relationships" xmlns:p="http://schemas.openxmlformats.org/presentationml/2006/main">
   <p:cSld>
     <p:spTree>
@@ -13864,7 +15540,7 @@
 </p:sld>
 </file>
 
-<file path=ppt/slides/slide25.xml><?xml version="1.0" encoding="utf-8"?>
+<file path=ppt/slides/slide28.xml><?xml version="1.0" encoding="utf-8"?>
 <p:sld xmlns:a="http://schemas.openxmlformats.org/drawingml/2006/main" xmlns:r="http://schemas.openxmlformats.org/officeDocument/2006/relationships" xmlns:p="http://schemas.openxmlformats.org/presentationml/2006/main">
   <p:cSld>
     <p:spTree>
@@ -13995,7 +15671,7 @@
 </p:sld>
 </file>
 
-<file path=ppt/slides/slide26.xml><?xml version="1.0" encoding="utf-8"?>
+<file path=ppt/slides/slide29.xml><?xml version="1.0" encoding="utf-8"?>
 <p:sld xmlns:a="http://schemas.openxmlformats.org/drawingml/2006/main" xmlns:r="http://schemas.openxmlformats.org/officeDocument/2006/relationships" xmlns:p="http://schemas.openxmlformats.org/presentationml/2006/main">
   <p:cSld>
     <p:spTree>
@@ -14894,7 +16570,162 @@
 </p:sld>
 </file>
 
-<file path=ppt/slides/slide27.xml><?xml version="1.0" encoding="utf-8"?>
+<file path=ppt/slides/slide3.xml><?xml version="1.0" encoding="utf-8"?>
+<p:sld xmlns:a="http://schemas.openxmlformats.org/drawingml/2006/main" xmlns:r="http://schemas.openxmlformats.org/officeDocument/2006/relationships" xmlns:p="http://schemas.openxmlformats.org/presentationml/2006/main">
+  <p:cSld>
+    <p:spTree>
+      <p:nvGrpSpPr>
+        <p:cNvPr id="1" name=""/>
+        <p:cNvGrpSpPr/>
+        <p:nvPr/>
+      </p:nvGrpSpPr>
+      <p:grpSpPr>
+        <a:xfrm>
+          <a:off x="0" y="0"/>
+          <a:ext cx="0" cy="0"/>
+          <a:chOff x="0" y="0"/>
+          <a:chExt cx="0" cy="0"/>
+        </a:xfrm>
+      </p:grpSpPr>
+      <p:sp>
+        <p:nvSpPr>
+          <p:cNvPr id="2" name="Content Placeholder 1"/>
+          <p:cNvSpPr>
+            <a:spLocks noGrp="1"/>
+          </p:cNvSpPr>
+          <p:nvPr>
+            <p:ph idx="1"/>
+          </p:nvPr>
+        </p:nvSpPr>
+        <p:spPr/>
+        <p:txBody>
+          <a:bodyPr/>
+          <a:lstStyle/>
+          <a:p>
+            <a:pPr marL="624078" indent="-514350"/>
+            <a:r>
+              <a:rPr lang="nl-BE" b="1" i="1" dirty="0" smtClean="0"/>
+              <a:t>Specification Workshop</a:t>
+            </a:r>
+          </a:p>
+          <a:p>
+            <a:pPr marL="624078" indent="-514350"/>
+            <a:endParaRPr lang="nl-BE" i="1" dirty="0" smtClean="0"/>
+          </a:p>
+          <a:p>
+            <a:pPr marL="624078" indent="-514350"/>
+            <a:r>
+              <a:rPr lang="nl-BE" dirty="0" smtClean="0"/>
+              <a:t>Setup Fitnesse</a:t>
+            </a:r>
+          </a:p>
+          <a:p>
+            <a:pPr marL="624078" indent="-514350"/>
+            <a:endParaRPr lang="nl-BE" i="1" dirty="0" smtClean="0"/>
+          </a:p>
+          <a:p>
+            <a:pPr marL="624078" indent="-514350"/>
+            <a:r>
+              <a:rPr lang="nl-BE" dirty="0" smtClean="0"/>
+              <a:t>Iteration 1</a:t>
+            </a:r>
+          </a:p>
+          <a:p>
+            <a:pPr marL="624078" indent="-514350"/>
+            <a:endParaRPr lang="nl-BE" i="1" dirty="0" smtClean="0"/>
+          </a:p>
+          <a:p>
+            <a:pPr marL="624078" indent="-514350"/>
+            <a:r>
+              <a:rPr lang="nl-BE" dirty="0" smtClean="0"/>
+              <a:t>Iteration 2</a:t>
+            </a:r>
+          </a:p>
+          <a:p>
+            <a:pPr marL="624078" indent="-514350"/>
+            <a:endParaRPr lang="nl-BE" i="1" dirty="0" smtClean="0"/>
+          </a:p>
+          <a:p>
+            <a:pPr marL="624078" indent="-514350"/>
+            <a:r>
+              <a:rPr lang="nl-BE" dirty="0" smtClean="0"/>
+              <a:t>What’s in it for you?</a:t>
+            </a:r>
+            <a:endParaRPr lang="nl-BE" i="1" dirty="0" smtClean="0"/>
+          </a:p>
+          <a:p>
+            <a:pPr marL="624078" indent="-514350"/>
+            <a:endParaRPr lang="nl-BE" i="1" dirty="0" smtClean="0"/>
+          </a:p>
+        </p:txBody>
+      </p:sp>
+      <p:sp>
+        <p:nvSpPr>
+          <p:cNvPr id="3" name="Title 2"/>
+          <p:cNvSpPr>
+            <a:spLocks noGrp="1"/>
+          </p:cNvSpPr>
+          <p:nvPr>
+            <p:ph type="title"/>
+          </p:nvPr>
+        </p:nvSpPr>
+        <p:spPr/>
+        <p:txBody>
+          <a:bodyPr>
+            <a:normAutofit fontScale="90000"/>
+          </a:bodyPr>
+          <a:lstStyle/>
+          <a:p>
+            <a:r>
+              <a:rPr lang="nl-BE" sz="3600" dirty="0" smtClean="0"/>
+              <a:t>Agile Acceptance Testing with Fitnesse</a:t>
+            </a:r>
+            <a:endParaRPr lang="nl-BE" sz="3600" dirty="0"/>
+          </a:p>
+        </p:txBody>
+      </p:sp>
+      <p:pic>
+        <p:nvPicPr>
+          <p:cNvPr id="5" name="Picture 2" descr="C:\Users\pascmest\AppData\Local\Microsoft\Windows\Temporary Internet Files\Content.IE5\R67MQFYW\MPj04053960000[1].jpg"/>
+          <p:cNvPicPr>
+            <a:picLocks noChangeAspect="1" noChangeArrowheads="1"/>
+          </p:cNvPicPr>
+          <p:nvPr/>
+        </p:nvPicPr>
+        <p:blipFill>
+          <a:blip r:embed="rId2" cstate="print"/>
+          <a:srcRect/>
+          <a:stretch>
+            <a:fillRect/>
+          </a:stretch>
+        </p:blipFill>
+        <p:spPr bwMode="auto">
+          <a:xfrm>
+            <a:off x="5443545" y="4214818"/>
+            <a:ext cx="3700487" cy="2643206"/>
+          </a:xfrm>
+          <a:prstGeom prst="rect">
+            <a:avLst/>
+          </a:prstGeom>
+          <a:noFill/>
+        </p:spPr>
+      </p:pic>
+    </p:spTree>
+  </p:cSld>
+  <p:clrMapOvr>
+    <a:masterClrMapping/>
+  </p:clrMapOvr>
+  <p:timing>
+    <p:tnLst>
+      <p:par>
+        <p:cTn id="1" dur="indefinite" restart="never" nodeType="tmRoot"/>
+      </p:par>
+    </p:tnLst>
+  </p:timing>
+</p:sld>
+</file>
+
+<file path=ppt/slides/slide30.xml><?xml version="1.0" encoding="utf-8"?>
 <p:sld xmlns:a="http://schemas.openxmlformats.org/drawingml/2006/main" xmlns:r="http://schemas.openxmlformats.org/officeDocument/2006/relationships" xmlns:p="http://schemas.openxmlformats.org/presentationml/2006/main">
   <p:cSld>
     <p:spTree>
@@ -14964,161 +16795,6 @@
             <a:headEnd/>
             <a:tailEnd/>
           </a:ln>
-        </p:spPr>
-      </p:pic>
-    </p:spTree>
-  </p:cSld>
-  <p:clrMapOvr>
-    <a:masterClrMapping/>
-  </p:clrMapOvr>
-  <p:timing>
-    <p:tnLst>
-      <p:par>
-        <p:cTn id="1" dur="indefinite" restart="never" nodeType="tmRoot"/>
-      </p:par>
-    </p:tnLst>
-  </p:timing>
-</p:sld>
-</file>
-
-<file path=ppt/slides/slide3.xml><?xml version="1.0" encoding="utf-8"?>
-<p:sld xmlns:a="http://schemas.openxmlformats.org/drawingml/2006/main" xmlns:r="http://schemas.openxmlformats.org/officeDocument/2006/relationships" xmlns:p="http://schemas.openxmlformats.org/presentationml/2006/main">
-  <p:cSld>
-    <p:spTree>
-      <p:nvGrpSpPr>
-        <p:cNvPr id="1" name=""/>
-        <p:cNvGrpSpPr/>
-        <p:nvPr/>
-      </p:nvGrpSpPr>
-      <p:grpSpPr>
-        <a:xfrm>
-          <a:off x="0" y="0"/>
-          <a:ext cx="0" cy="0"/>
-          <a:chOff x="0" y="0"/>
-          <a:chExt cx="0" cy="0"/>
-        </a:xfrm>
-      </p:grpSpPr>
-      <p:sp>
-        <p:nvSpPr>
-          <p:cNvPr id="2" name="Content Placeholder 1"/>
-          <p:cNvSpPr>
-            <a:spLocks noGrp="1"/>
-          </p:cNvSpPr>
-          <p:nvPr>
-            <p:ph idx="1"/>
-          </p:nvPr>
-        </p:nvSpPr>
-        <p:spPr/>
-        <p:txBody>
-          <a:bodyPr/>
-          <a:lstStyle/>
-          <a:p>
-            <a:pPr marL="624078" indent="-514350"/>
-            <a:r>
-              <a:rPr lang="nl-BE" b="1" i="1" dirty="0" smtClean="0"/>
-              <a:t>Specification Workshop</a:t>
-            </a:r>
-          </a:p>
-          <a:p>
-            <a:pPr marL="624078" indent="-514350"/>
-            <a:endParaRPr lang="nl-BE" i="1" dirty="0" smtClean="0"/>
-          </a:p>
-          <a:p>
-            <a:pPr marL="624078" indent="-514350"/>
-            <a:r>
-              <a:rPr lang="nl-BE" dirty="0" smtClean="0"/>
-              <a:t>Setup Fitnesse</a:t>
-            </a:r>
-          </a:p>
-          <a:p>
-            <a:pPr marL="624078" indent="-514350"/>
-            <a:endParaRPr lang="nl-BE" i="1" dirty="0" smtClean="0"/>
-          </a:p>
-          <a:p>
-            <a:pPr marL="624078" indent="-514350"/>
-            <a:r>
-              <a:rPr lang="nl-BE" dirty="0" smtClean="0"/>
-              <a:t>Iteration 1</a:t>
-            </a:r>
-          </a:p>
-          <a:p>
-            <a:pPr marL="624078" indent="-514350"/>
-            <a:endParaRPr lang="nl-BE" i="1" dirty="0" smtClean="0"/>
-          </a:p>
-          <a:p>
-            <a:pPr marL="624078" indent="-514350"/>
-            <a:r>
-              <a:rPr lang="nl-BE" dirty="0" smtClean="0"/>
-              <a:t>Iteration 2</a:t>
-            </a:r>
-          </a:p>
-          <a:p>
-            <a:pPr marL="624078" indent="-514350"/>
-            <a:endParaRPr lang="nl-BE" i="1" dirty="0" smtClean="0"/>
-          </a:p>
-          <a:p>
-            <a:pPr marL="624078" indent="-514350"/>
-            <a:r>
-              <a:rPr lang="nl-BE" dirty="0" smtClean="0"/>
-              <a:t>What’s in it for you?</a:t>
-            </a:r>
-            <a:endParaRPr lang="nl-BE" i="1" dirty="0" smtClean="0"/>
-          </a:p>
-          <a:p>
-            <a:pPr marL="624078" indent="-514350"/>
-            <a:endParaRPr lang="nl-BE" i="1" dirty="0" smtClean="0"/>
-          </a:p>
-        </p:txBody>
-      </p:sp>
-      <p:sp>
-        <p:nvSpPr>
-          <p:cNvPr id="3" name="Title 2"/>
-          <p:cNvSpPr>
-            <a:spLocks noGrp="1"/>
-          </p:cNvSpPr>
-          <p:nvPr>
-            <p:ph type="title"/>
-          </p:nvPr>
-        </p:nvSpPr>
-        <p:spPr/>
-        <p:txBody>
-          <a:bodyPr>
-            <a:normAutofit fontScale="90000"/>
-          </a:bodyPr>
-          <a:lstStyle/>
-          <a:p>
-            <a:r>
-              <a:rPr lang="nl-BE" sz="3600" dirty="0" smtClean="0"/>
-              <a:t>Agile Acceptance Testing with Fitnesse</a:t>
-            </a:r>
-            <a:endParaRPr lang="nl-BE" sz="3600" dirty="0"/>
-          </a:p>
-        </p:txBody>
-      </p:sp>
-      <p:pic>
-        <p:nvPicPr>
-          <p:cNvPr id="5" name="Picture 2" descr="C:\Users\pascmest\AppData\Local\Microsoft\Windows\Temporary Internet Files\Content.IE5\R67MQFYW\MPj04053960000[1].jpg"/>
-          <p:cNvPicPr>
-            <a:picLocks noChangeAspect="1" noChangeArrowheads="1"/>
-          </p:cNvPicPr>
-          <p:nvPr/>
-        </p:nvPicPr>
-        <p:blipFill>
-          <a:blip r:embed="rId2" cstate="print"/>
-          <a:srcRect/>
-          <a:stretch>
-            <a:fillRect/>
-          </a:stretch>
-        </p:blipFill>
-        <p:spPr bwMode="auto">
-          <a:xfrm>
-            <a:off x="5443545" y="4214818"/>
-            <a:ext cx="3700487" cy="2643206"/>
-          </a:xfrm>
-          <a:prstGeom prst="rect">
-            <a:avLst/>
-          </a:prstGeom>
-          <a:noFill/>
         </p:spPr>
       </p:pic>
     </p:spTree>

</xml_diff>